<commit_message>
fin projet - 20221109
</commit_message>
<xml_diff>
--- a/Présentation.pptx
+++ b/Présentation.pptx
@@ -5,11 +5,12 @@
     <p:sldMasterId id="2147483648" r:id="rId1"/>
   </p:sldMasterIdLst>
   <p:sldIdLst>
-    <p:sldId id="256" r:id="rId2"/>
-    <p:sldId id="257" r:id="rId3"/>
-    <p:sldId id="259" r:id="rId4"/>
-    <p:sldId id="258" r:id="rId5"/>
+    <p:sldId id="258" r:id="rId2"/>
+    <p:sldId id="256" r:id="rId3"/>
+    <p:sldId id="261" r:id="rId4"/>
+    <p:sldId id="259" r:id="rId5"/>
     <p:sldId id="260" r:id="rId6"/>
+    <p:sldId id="262" r:id="rId7"/>
   </p:sldIdLst>
   <p:sldSz cx="12192000" cy="6858000"/>
   <p:notesSz cx="6858000" cy="9144000"/>
@@ -108,6 +109,11 @@
       </a:defRPr>
     </a:lvl9pPr>
   </p:defaultTextStyle>
+  <p:extLst>
+    <p:ext uri="{EFAFB233-063F-42B5-8137-9DF3F51BA10A}">
+      <p15:sldGuideLst xmlns:p15="http://schemas.microsoft.com/office/powerpoint/2012/main"/>
+    </p:ext>
+  </p:extLst>
 </p:presentation>
 </file>
 
@@ -258,7 +264,7 @@
           <a:p>
             <a:fld id="{D6ACE600-7D10-B848-8791-7397D140E46A}" type="datetimeFigureOut">
               <a:rPr lang="fr-FR" smtClean="0"/>
-              <a:t>07/11/2022</a:t>
+              <a:t>08/11/2022</a:t>
             </a:fld>
             <a:endParaRPr lang="fr-FR"/>
           </a:p>
@@ -456,7 +462,7 @@
           <a:p>
             <a:fld id="{D6ACE600-7D10-B848-8791-7397D140E46A}" type="datetimeFigureOut">
               <a:rPr lang="fr-FR" smtClean="0"/>
-              <a:t>07/11/2022</a:t>
+              <a:t>08/11/2022</a:t>
             </a:fld>
             <a:endParaRPr lang="fr-FR"/>
           </a:p>
@@ -664,7 +670,7 @@
           <a:p>
             <a:fld id="{D6ACE600-7D10-B848-8791-7397D140E46A}" type="datetimeFigureOut">
               <a:rPr lang="fr-FR" smtClean="0"/>
-              <a:t>07/11/2022</a:t>
+              <a:t>08/11/2022</a:t>
             </a:fld>
             <a:endParaRPr lang="fr-FR"/>
           </a:p>
@@ -862,7 +868,7 @@
           <a:p>
             <a:fld id="{D6ACE600-7D10-B848-8791-7397D140E46A}" type="datetimeFigureOut">
               <a:rPr lang="fr-FR" smtClean="0"/>
-              <a:t>07/11/2022</a:t>
+              <a:t>08/11/2022</a:t>
             </a:fld>
             <a:endParaRPr lang="fr-FR"/>
           </a:p>
@@ -1137,7 +1143,7 @@
           <a:p>
             <a:fld id="{D6ACE600-7D10-B848-8791-7397D140E46A}" type="datetimeFigureOut">
               <a:rPr lang="fr-FR" smtClean="0"/>
-              <a:t>07/11/2022</a:t>
+              <a:t>08/11/2022</a:t>
             </a:fld>
             <a:endParaRPr lang="fr-FR"/>
           </a:p>
@@ -1402,7 +1408,7 @@
           <a:p>
             <a:fld id="{D6ACE600-7D10-B848-8791-7397D140E46A}" type="datetimeFigureOut">
               <a:rPr lang="fr-FR" smtClean="0"/>
-              <a:t>07/11/2022</a:t>
+              <a:t>08/11/2022</a:t>
             </a:fld>
             <a:endParaRPr lang="fr-FR"/>
           </a:p>
@@ -1814,7 +1820,7 @@
           <a:p>
             <a:fld id="{D6ACE600-7D10-B848-8791-7397D140E46A}" type="datetimeFigureOut">
               <a:rPr lang="fr-FR" smtClean="0"/>
-              <a:t>07/11/2022</a:t>
+              <a:t>08/11/2022</a:t>
             </a:fld>
             <a:endParaRPr lang="fr-FR"/>
           </a:p>
@@ -1955,7 +1961,7 @@
           <a:p>
             <a:fld id="{D6ACE600-7D10-B848-8791-7397D140E46A}" type="datetimeFigureOut">
               <a:rPr lang="fr-FR" smtClean="0"/>
-              <a:t>07/11/2022</a:t>
+              <a:t>08/11/2022</a:t>
             </a:fld>
             <a:endParaRPr lang="fr-FR"/>
           </a:p>
@@ -2068,7 +2074,7 @@
           <a:p>
             <a:fld id="{D6ACE600-7D10-B848-8791-7397D140E46A}" type="datetimeFigureOut">
               <a:rPr lang="fr-FR" smtClean="0"/>
-              <a:t>07/11/2022</a:t>
+              <a:t>08/11/2022</a:t>
             </a:fld>
             <a:endParaRPr lang="fr-FR"/>
           </a:p>
@@ -2379,7 +2385,7 @@
           <a:p>
             <a:fld id="{D6ACE600-7D10-B848-8791-7397D140E46A}" type="datetimeFigureOut">
               <a:rPr lang="fr-FR" smtClean="0"/>
-              <a:t>07/11/2022</a:t>
+              <a:t>08/11/2022</a:t>
             </a:fld>
             <a:endParaRPr lang="fr-FR"/>
           </a:p>
@@ -2667,7 +2673,7 @@
           <a:p>
             <a:fld id="{D6ACE600-7D10-B848-8791-7397D140E46A}" type="datetimeFigureOut">
               <a:rPr lang="fr-FR" smtClean="0"/>
-              <a:t>07/11/2022</a:t>
+              <a:t>08/11/2022</a:t>
             </a:fld>
             <a:endParaRPr lang="fr-FR"/>
           </a:p>
@@ -2908,7 +2914,7 @@
           <a:p>
             <a:fld id="{D6ACE600-7D10-B848-8791-7397D140E46A}" type="datetimeFigureOut">
               <a:rPr lang="fr-FR" smtClean="0"/>
-              <a:t>07/11/2022</a:t>
+              <a:t>08/11/2022</a:t>
             </a:fld>
             <a:endParaRPr lang="fr-FR"/>
           </a:p>
@@ -3325,12 +3331,59 @@
           <a:chExt cx="0" cy="0"/>
         </a:xfrm>
       </p:grpSpPr>
-      <p:sp>
-        <p:nvSpPr>
-          <p:cNvPr id="4" name="ZoneTexte 3">
-            <a:extLst>
-              <a:ext uri="{FF2B5EF4-FFF2-40B4-BE49-F238E27FC236}">
-                <a16:creationId xmlns:a16="http://schemas.microsoft.com/office/drawing/2014/main" id="{95AE3629-72A0-15B5-2DC2-4B3D5A954101}"/>
+      <p:pic>
+        <p:nvPicPr>
+          <p:cNvPr id="6146" name="Picture 2">
+            <a:extLst>
+              <a:ext uri="{FF2B5EF4-FFF2-40B4-BE49-F238E27FC236}">
+                <a16:creationId xmlns:a16="http://schemas.microsoft.com/office/drawing/2014/main" id="{AC2AEFE9-FDCD-9C60-1BAE-D5B55AD625F1}"/>
+              </a:ext>
+            </a:extLst>
+          </p:cNvPr>
+          <p:cNvPicPr>
+            <a:picLocks noChangeAspect="1" noChangeArrowheads="1"/>
+          </p:cNvPicPr>
+          <p:nvPr/>
+        </p:nvPicPr>
+        <p:blipFill>
+          <a:blip r:embed="rId2">
+            <a:extLst>
+              <a:ext uri="{28A0092B-C50C-407E-A947-70E740481C1C}">
+                <a14:useLocalDpi xmlns:a14="http://schemas.microsoft.com/office/drawing/2010/main" val="0"/>
+              </a:ext>
+            </a:extLst>
+          </a:blip>
+          <a:srcRect/>
+          <a:stretch>
+            <a:fillRect/>
+          </a:stretch>
+        </p:blipFill>
+        <p:spPr bwMode="auto">
+          <a:xfrm>
+            <a:off x="2871549" y="2413000"/>
+            <a:ext cx="2032000" cy="2032000"/>
+          </a:xfrm>
+          <a:prstGeom prst="rect">
+            <a:avLst/>
+          </a:prstGeom>
+          <a:noFill/>
+          <a:extLst>
+            <a:ext uri="{909E8E84-426E-40DD-AFC4-6F175D3DCCD1}">
+              <a14:hiddenFill xmlns:a14="http://schemas.microsoft.com/office/drawing/2010/main">
+                <a:solidFill>
+                  <a:srgbClr val="FFFFFF"/>
+                </a:solidFill>
+              </a14:hiddenFill>
+            </a:ext>
+          </a:extLst>
+        </p:spPr>
+      </p:pic>
+      <p:sp>
+        <p:nvSpPr>
+          <p:cNvPr id="3" name="ZoneTexte 2">
+            <a:extLst>
+              <a:ext uri="{FF2B5EF4-FFF2-40B4-BE49-F238E27FC236}">
+                <a16:creationId xmlns:a16="http://schemas.microsoft.com/office/drawing/2014/main" id="{39DC70B8-EF76-0B2C-6583-087EF8EF002E}"/>
               </a:ext>
             </a:extLst>
           </p:cNvPr>
@@ -3339,8 +3392,8 @@
         </p:nvSpPr>
         <p:spPr>
           <a:xfrm>
-            <a:off x="3840414" y="3244334"/>
-            <a:ext cx="4511171" cy="369332"/>
+            <a:off x="4903549" y="3167390"/>
+            <a:ext cx="4508670" cy="523220"/>
           </a:xfrm>
           <a:prstGeom prst="rect">
             <a:avLst/>
@@ -3354,8 +3407,43 @@
           <a:lstStyle/>
           <a:p>
             <a:r>
+              <a:rPr lang="fr-FR" sz="2800" dirty="0"/>
+              <a:t>Tech Challenge (Data Science)</a:t>
+            </a:r>
+          </a:p>
+        </p:txBody>
+      </p:sp>
+      <p:sp>
+        <p:nvSpPr>
+          <p:cNvPr id="4" name="ZoneTexte 3">
+            <a:extLst>
+              <a:ext uri="{FF2B5EF4-FFF2-40B4-BE49-F238E27FC236}">
+                <a16:creationId xmlns:a16="http://schemas.microsoft.com/office/drawing/2014/main" id="{131C6B1A-C11E-CE25-F094-944A2283F640}"/>
+              </a:ext>
+            </a:extLst>
+          </p:cNvPr>
+          <p:cNvSpPr txBox="1"/>
+          <p:nvPr/>
+        </p:nvSpPr>
+        <p:spPr>
+          <a:xfrm>
+            <a:off x="9763433" y="6488668"/>
+            <a:ext cx="2428567" cy="369332"/>
+          </a:xfrm>
+          <a:prstGeom prst="rect">
+            <a:avLst/>
+          </a:prstGeom>
+          <a:noFill/>
+        </p:spPr>
+        <p:txBody>
+          <a:bodyPr wrap="square" rtlCol="0">
+            <a:spAutoFit/>
+          </a:bodyPr>
+          <a:lstStyle/>
+          <a:p>
+            <a:r>
               <a:rPr lang="fr-FR" dirty="0"/>
-              <a:t>A QUELLE BOUTIQUE APPARTIENT LE FICHIER?</a:t>
+              <a:t>Laetitia V. - 09/11/2022</a:t>
             </a:r>
           </a:p>
         </p:txBody>
@@ -3363,7 +3451,7 @@
     </p:spTree>
     <p:extLst>
       <p:ext uri="{BB962C8B-B14F-4D97-AF65-F5344CB8AC3E}">
-        <p14:creationId xmlns:p14="http://schemas.microsoft.com/office/powerpoint/2010/main" val="1926286280"/>
+        <p14:creationId xmlns:p14="http://schemas.microsoft.com/office/powerpoint/2010/main" val="3112204254"/>
       </p:ext>
     </p:extLst>
   </p:cSld>
@@ -3404,8 +3492,8 @@
         </p:nvSpPr>
         <p:spPr>
           <a:xfrm>
-            <a:off x="4977873" y="3244334"/>
-            <a:ext cx="2236253" cy="369332"/>
+            <a:off x="2377578" y="-5401"/>
+            <a:ext cx="7436844" cy="646331"/>
           </a:xfrm>
           <a:prstGeom prst="rect">
             <a:avLst/>
@@ -3419,8 +3507,500 @@
           <a:lstStyle/>
           <a:p>
             <a:r>
+              <a:rPr lang="fr-FR" sz="3600" dirty="0"/>
+              <a:t>Analyse des ventes des produits - 2019</a:t>
+            </a:r>
+          </a:p>
+        </p:txBody>
+      </p:sp>
+      <p:pic>
+        <p:nvPicPr>
+          <p:cNvPr id="7" name="Image 6">
+            <a:extLst>
+              <a:ext uri="{FF2B5EF4-FFF2-40B4-BE49-F238E27FC236}">
+                <a16:creationId xmlns:a16="http://schemas.microsoft.com/office/drawing/2014/main" id="{15DC66D6-DAFB-C765-DA82-E04EEC2B27D7}"/>
+              </a:ext>
+            </a:extLst>
+          </p:cNvPr>
+          <p:cNvPicPr>
+            <a:picLocks noChangeAspect="1"/>
+          </p:cNvPicPr>
+          <p:nvPr/>
+        </p:nvPicPr>
+        <p:blipFill rotWithShape="1">
+          <a:blip r:embed="rId2">
+            <a:extLst>
+              <a:ext uri="{BEBA8EAE-BF5A-486C-A8C5-ECC9F3942E4B}">
+                <a14:imgProps xmlns:a14="http://schemas.microsoft.com/office/drawing/2010/main">
+                  <a14:imgLayer r:embed="rId3">
+                    <a14:imgEffect>
+                      <a14:backgroundRemoval t="12778" b="86528" l="26204" r="81944">
+                        <a14:foregroundMark x1="28796" y1="45694" x2="26204" y2="46667"/>
+                        <a14:foregroundMark x1="47870" y1="20139" x2="47963" y2="17222"/>
+                        <a14:foregroundMark x1="52500" y1="19306" x2="51667" y2="16111"/>
+                        <a14:foregroundMark x1="69444" y1="59028" x2="72130" y2="56944"/>
+                        <a14:foregroundMark x1="60000" y1="76389" x2="50648" y2="86528"/>
+                        <a14:foregroundMark x1="46481" y1="21250" x2="50370" y2="15278"/>
+                        <a14:foregroundMark x1="73241" y1="53750" x2="73241" y2="53750"/>
+                        <a14:foregroundMark x1="42593" y1="18056" x2="42222" y2="14167"/>
+                        <a14:foregroundMark x1="53426" y1="16528" x2="54630" y2="14583"/>
+                        <a14:foregroundMark x1="51852" y1="14583" x2="45278" y2="15417"/>
+                        <a14:foregroundMark x1="45278" y1="15417" x2="45185" y2="15139"/>
+                        <a14:foregroundMark x1="45741" y1="14167" x2="54907" y2="15556"/>
+                        <a14:foregroundMark x1="54907" y1="15556" x2="56481" y2="15556"/>
+                        <a14:foregroundMark x1="51481" y1="14167" x2="53519" y2="15000"/>
+                        <a14:foregroundMark x1="52407" y1="14167" x2="44630" y2="13194"/>
+                        <a14:foregroundMark x1="44630" y1="13194" x2="54167" y2="15000"/>
+                        <a14:foregroundMark x1="54167" y1="15000" x2="55463" y2="14722"/>
+                        <a14:foregroundMark x1="62500" y1="17778" x2="56574" y2="13472"/>
+                        <a14:foregroundMark x1="56574" y1="13472" x2="42315" y2="12778"/>
+                        <a14:foregroundMark x1="42315" y1="12778" x2="40093" y2="23333"/>
+                        <a14:foregroundMark x1="40093" y1="23333" x2="70556" y2="15833"/>
+                        <a14:foregroundMark x1="70556" y1="15833" x2="70926" y2="14722"/>
+                        <a14:foregroundMark x1="38796" y1="16250" x2="31852" y2="20556"/>
+                        <a14:foregroundMark x1="31852" y1="20556" x2="24074" y2="40139"/>
+                        <a14:foregroundMark x1="24074" y1="40139" x2="23056" y2="71250"/>
+                        <a14:foregroundMark x1="23056" y1="71250" x2="34167" y2="87361"/>
+                        <a14:foregroundMark x1="34167" y1="87361" x2="55000" y2="90972"/>
+                        <a14:foregroundMark x1="55000" y1="90972" x2="61944" y2="88611"/>
+                        <a14:foregroundMark x1="61944" y1="88611" x2="74195" y2="76292"/>
+                        <a14:foregroundMark x1="82122" y1="51268" x2="82064" y2="47884"/>
+                        <a14:foregroundMark x1="76023" y1="32954" x2="63889" y2="16806"/>
+                        <a14:foregroundMark x1="81108" y1="39721" x2="79929" y2="38152"/>
+                        <a14:backgroundMark x1="81296" y1="51667" x2="81852" y2="54167"/>
+                        <a14:backgroundMark x1="81667" y1="53611" x2="82222" y2="42500"/>
+                        <a14:backgroundMark x1="82222" y1="42500" x2="81944" y2="40694"/>
+                        <a14:backgroundMark x1="83056" y1="39028" x2="80278" y2="48056"/>
+                        <a14:backgroundMark x1="80278" y1="48056" x2="81019" y2="71250"/>
+                        <a14:backgroundMark x1="81019" y1="71250" x2="84722" y2="62500"/>
+                        <a14:backgroundMark x1="84722" y1="62500" x2="81389" y2="36667"/>
+                        <a14:backgroundMark x1="79537" y1="33194" x2="76111" y2="46250"/>
+                        <a14:backgroundMark x1="76111" y1="46250" x2="75833" y2="69167"/>
+                        <a14:backgroundMark x1="75833" y1="69167" x2="82593" y2="68194"/>
+                        <a14:backgroundMark x1="82593" y1="68194" x2="83796" y2="32083"/>
+                        <a14:backgroundMark x1="83796" y1="32083" x2="80093" y2="32778"/>
+                        <a14:backgroundMark x1="77593" y1="32361" x2="77685" y2="42639"/>
+                        <a14:backgroundMark x1="77685" y1="42639" x2="78148" y2="42778"/>
+                        <a14:backgroundMark x1="80370" y1="46944" x2="80741" y2="60139"/>
+                        <a14:backgroundMark x1="80741" y1="60139" x2="84167" y2="70139"/>
+                        <a14:backgroundMark x1="84167" y1="70139" x2="84167" y2="70833"/>
+                        <a14:backgroundMark x1="80833" y1="71528" x2="73889" y2="73889"/>
+                        <a14:backgroundMark x1="73889" y1="73889" x2="80833" y2="76806"/>
+                        <a14:backgroundMark x1="80833" y1="76806" x2="81852" y2="68611"/>
+                      </a14:backgroundRemoval>
+                    </a14:imgEffect>
+                  </a14:imgLayer>
+                </a14:imgProps>
+              </a:ext>
+            </a:extLst>
+          </a:blip>
+          <a:srcRect l="23308" t="9199" r="24297" b="10104"/>
+          <a:stretch/>
+        </p:blipFill>
+        <p:spPr>
+          <a:xfrm>
+            <a:off x="472271" y="1738045"/>
+            <a:ext cx="3785190" cy="3886578"/>
+          </a:xfrm>
+          <a:prstGeom prst="rect">
+            <a:avLst/>
+          </a:prstGeom>
+        </p:spPr>
+      </p:pic>
+      <p:grpSp>
+        <p:nvGrpSpPr>
+          <p:cNvPr id="10" name="Groupe 9">
+            <a:extLst>
+              <a:ext uri="{FF2B5EF4-FFF2-40B4-BE49-F238E27FC236}">
+                <a16:creationId xmlns:a16="http://schemas.microsoft.com/office/drawing/2014/main" id="{C0F236EE-67B3-791B-3730-F0C4BCD9DF00}"/>
+              </a:ext>
+            </a:extLst>
+          </p:cNvPr>
+          <p:cNvGrpSpPr/>
+          <p:nvPr/>
+        </p:nvGrpSpPr>
+        <p:grpSpPr>
+          <a:xfrm>
+            <a:off x="374640" y="2039816"/>
+            <a:ext cx="512286" cy="291402"/>
+            <a:chOff x="284205" y="2371411"/>
+            <a:chExt cx="512286" cy="291402"/>
+          </a:xfrm>
+        </p:grpSpPr>
+        <p:pic>
+          <p:nvPicPr>
+            <p:cNvPr id="8" name="Image 7">
+              <a:extLst>
+                <a:ext uri="{FF2B5EF4-FFF2-40B4-BE49-F238E27FC236}">
+                  <a16:creationId xmlns:a16="http://schemas.microsoft.com/office/drawing/2014/main" id="{A1DE4705-72CD-7D41-2D36-FE602ABDEFB0}"/>
+                </a:ext>
+              </a:extLst>
+            </p:cNvPr>
+            <p:cNvPicPr>
+              <a:picLocks noChangeAspect="1"/>
+            </p:cNvPicPr>
+            <p:nvPr/>
+          </p:nvPicPr>
+          <p:blipFill rotWithShape="1">
+            <a:blip r:embed="rId4">
+              <a:extLst>
+                <a:ext uri="{BEBA8EAE-BF5A-486C-A8C5-ECC9F3942E4B}">
+                  <a14:imgProps xmlns:a14="http://schemas.microsoft.com/office/drawing/2010/main">
+                    <a14:imgLayer r:embed="rId5">
+                      <a14:imgEffect>
+                        <a14:backgroundRemoval t="17587" b="19609" l="94958" r="99440"/>
+                      </a14:imgEffect>
+                    </a14:imgLayer>
+                  </a14:imgProps>
+                </a:ext>
+              </a:extLst>
+            </a:blip>
+            <a:srcRect l="94398" t="17334" r="-194" b="80138"/>
+            <a:stretch/>
+          </p:blipFill>
+          <p:spPr>
+            <a:xfrm>
+              <a:off x="381836" y="2371411"/>
+              <a:ext cx="414655" cy="120580"/>
+            </a:xfrm>
+            <a:prstGeom prst="rect">
+              <a:avLst/>
+            </a:prstGeom>
+          </p:spPr>
+        </p:pic>
+        <p:pic>
+          <p:nvPicPr>
+            <p:cNvPr id="9" name="Image 8">
+              <a:extLst>
+                <a:ext uri="{FF2B5EF4-FFF2-40B4-BE49-F238E27FC236}">
+                  <a16:creationId xmlns:a16="http://schemas.microsoft.com/office/drawing/2014/main" id="{FC8FCC29-0A69-079B-76AF-F25A6E761CC7}"/>
+                </a:ext>
+              </a:extLst>
+            </p:cNvPr>
+            <p:cNvPicPr>
+              <a:picLocks noChangeAspect="1"/>
+            </p:cNvPicPr>
+            <p:nvPr/>
+          </p:nvPicPr>
+          <p:blipFill rotWithShape="1">
+            <a:blip r:embed="rId6">
+              <a:extLst>
+                <a:ext uri="{BEBA8EAE-BF5A-486C-A8C5-ECC9F3942E4B}">
+                  <a14:imgProps xmlns:a14="http://schemas.microsoft.com/office/drawing/2010/main">
+                    <a14:imgLayer r:embed="rId7">
+                      <a14:imgEffect>
+                        <a14:backgroundRemoval t="14111" b="16977" l="93613" r="98249">
+                          <a14:foregroundMark x1="95185" y1="16389" x2="95093" y2="15278"/>
+                        </a14:backgroundRemoval>
+                      </a14:imgEffect>
+                    </a14:imgLayer>
+                  </a14:imgProps>
+                </a:ext>
+              </a:extLst>
+            </a:blip>
+            <a:srcRect l="93033" t="13753" r="1171" b="82665"/>
+            <a:stretch/>
+          </p:blipFill>
+          <p:spPr>
+            <a:xfrm>
+              <a:off x="284205" y="2491991"/>
+              <a:ext cx="414654" cy="170822"/>
+            </a:xfrm>
+            <a:prstGeom prst="rect">
+              <a:avLst/>
+            </a:prstGeom>
+          </p:spPr>
+        </p:pic>
+      </p:grpSp>
+      <p:pic>
+        <p:nvPicPr>
+          <p:cNvPr id="14" name="Image 13">
+            <a:extLst>
+              <a:ext uri="{FF2B5EF4-FFF2-40B4-BE49-F238E27FC236}">
+                <a16:creationId xmlns:a16="http://schemas.microsoft.com/office/drawing/2014/main" id="{C50097C3-FB76-9828-DAA5-46426807ABA0}"/>
+              </a:ext>
+            </a:extLst>
+          </p:cNvPr>
+          <p:cNvPicPr>
+            <a:picLocks noChangeAspect="1"/>
+          </p:cNvPicPr>
+          <p:nvPr/>
+        </p:nvPicPr>
+        <p:blipFill rotWithShape="1">
+          <a:blip r:embed="rId8"/>
+          <a:srcRect t="12460" b="3230"/>
+          <a:stretch/>
+        </p:blipFill>
+        <p:spPr>
+          <a:xfrm>
+            <a:off x="5807805" y="3240268"/>
+            <a:ext cx="6285550" cy="3532881"/>
+          </a:xfrm>
+          <a:prstGeom prst="rect">
+            <a:avLst/>
+          </a:prstGeom>
+        </p:spPr>
+      </p:pic>
+      <p:sp>
+        <p:nvSpPr>
+          <p:cNvPr id="15" name="ZoneTexte 14">
+            <a:extLst>
+              <a:ext uri="{FF2B5EF4-FFF2-40B4-BE49-F238E27FC236}">
+                <a16:creationId xmlns:a16="http://schemas.microsoft.com/office/drawing/2014/main" id="{17E2711F-0940-A90F-B416-6F7AD9D270CF}"/>
+              </a:ext>
+            </a:extLst>
+          </p:cNvPr>
+          <p:cNvSpPr txBox="1"/>
+          <p:nvPr/>
+        </p:nvSpPr>
+        <p:spPr>
+          <a:xfrm>
+            <a:off x="1195154" y="1368713"/>
+            <a:ext cx="2339423" cy="369332"/>
+          </a:xfrm>
+          <a:prstGeom prst="rect">
+            <a:avLst/>
+          </a:prstGeom>
+          <a:noFill/>
+        </p:spPr>
+        <p:txBody>
+          <a:bodyPr wrap="none" rtlCol="0">
+            <a:spAutoFit/>
+          </a:bodyPr>
+          <a:lstStyle/>
+          <a:p>
+            <a:r>
               <a:rPr lang="fr-FR" dirty="0"/>
-              <a:t>IMPACT DE LA METEO</a:t>
+              <a:t>Répartition des ventes</a:t>
+            </a:r>
+          </a:p>
+        </p:txBody>
+      </p:sp>
+      <p:sp>
+        <p:nvSpPr>
+          <p:cNvPr id="16" name="ZoneTexte 15">
+            <a:extLst>
+              <a:ext uri="{FF2B5EF4-FFF2-40B4-BE49-F238E27FC236}">
+                <a16:creationId xmlns:a16="http://schemas.microsoft.com/office/drawing/2014/main" id="{1B3911D5-4B62-7F06-7175-F6DEC9CA8FA2}"/>
+              </a:ext>
+            </a:extLst>
+          </p:cNvPr>
+          <p:cNvSpPr txBox="1"/>
+          <p:nvPr/>
+        </p:nvSpPr>
+        <p:spPr>
+          <a:xfrm>
+            <a:off x="7792510" y="2654016"/>
+            <a:ext cx="1984774" cy="369332"/>
+          </a:xfrm>
+          <a:prstGeom prst="rect">
+            <a:avLst/>
+          </a:prstGeom>
+          <a:noFill/>
+        </p:spPr>
+        <p:txBody>
+          <a:bodyPr wrap="none" rtlCol="0">
+            <a:spAutoFit/>
+          </a:bodyPr>
+          <a:lstStyle/>
+          <a:p>
+            <a:r>
+              <a:rPr lang="fr-FR" dirty="0"/>
+              <a:t>Ventes mensuelles</a:t>
+            </a:r>
+          </a:p>
+        </p:txBody>
+      </p:sp>
+      <p:sp>
+        <p:nvSpPr>
+          <p:cNvPr id="17" name="ZoneTexte 16">
+            <a:extLst>
+              <a:ext uri="{FF2B5EF4-FFF2-40B4-BE49-F238E27FC236}">
+                <a16:creationId xmlns:a16="http://schemas.microsoft.com/office/drawing/2014/main" id="{A92506DE-48FC-D676-90C7-5DFDEF724D9C}"/>
+              </a:ext>
+            </a:extLst>
+          </p:cNvPr>
+          <p:cNvSpPr txBox="1"/>
+          <p:nvPr/>
+        </p:nvSpPr>
+        <p:spPr>
+          <a:xfrm>
+            <a:off x="472271" y="4457448"/>
+            <a:ext cx="3882821" cy="646331"/>
+          </a:xfrm>
+          <a:prstGeom prst="rect">
+            <a:avLst/>
+          </a:prstGeom>
+          <a:solidFill>
+            <a:schemeClr val="bg1">
+              <a:alpha val="58068"/>
+            </a:schemeClr>
+          </a:solidFill>
+        </p:spPr>
+        <p:txBody>
+          <a:bodyPr wrap="square" rtlCol="0">
+            <a:spAutoFit/>
+          </a:bodyPr>
+          <a:lstStyle/>
+          <a:p>
+            <a:pPr algn="just"/>
+            <a:r>
+              <a:rPr lang="fr-FR" dirty="0"/>
+              <a:t>Le produit B* se vend mieux que le produit A en terme de volume.</a:t>
+            </a:r>
+          </a:p>
+        </p:txBody>
+      </p:sp>
+      <p:sp>
+        <p:nvSpPr>
+          <p:cNvPr id="18" name="ZoneTexte 17">
+            <a:extLst>
+              <a:ext uri="{FF2B5EF4-FFF2-40B4-BE49-F238E27FC236}">
+                <a16:creationId xmlns:a16="http://schemas.microsoft.com/office/drawing/2014/main" id="{89AB1642-CE7F-1C21-7CE9-6A02C3A83A36}"/>
+              </a:ext>
+            </a:extLst>
+          </p:cNvPr>
+          <p:cNvSpPr txBox="1"/>
+          <p:nvPr/>
+        </p:nvSpPr>
+        <p:spPr>
+          <a:xfrm>
+            <a:off x="5609321" y="1161774"/>
+            <a:ext cx="4167963" cy="646331"/>
+          </a:xfrm>
+          <a:prstGeom prst="rect">
+            <a:avLst/>
+          </a:prstGeom>
+          <a:solidFill>
+            <a:srgbClr val="00B0F0">
+              <a:alpha val="31000"/>
+            </a:srgbClr>
+          </a:solidFill>
+        </p:spPr>
+        <p:txBody>
+          <a:bodyPr wrap="square" rtlCol="0">
+            <a:spAutoFit/>
+          </a:bodyPr>
+          <a:lstStyle/>
+          <a:p>
+            <a:r>
+              <a:rPr lang="fr-FR" dirty="0"/>
+              <a:t>Le produit A est un produit dont les ventes se font plutôt à la saison froide...</a:t>
+            </a:r>
+          </a:p>
+        </p:txBody>
+      </p:sp>
+      <p:sp>
+        <p:nvSpPr>
+          <p:cNvPr id="20" name="ZoneTexte 19">
+            <a:extLst>
+              <a:ext uri="{FF2B5EF4-FFF2-40B4-BE49-F238E27FC236}">
+                <a16:creationId xmlns:a16="http://schemas.microsoft.com/office/drawing/2014/main" id="{BF4BA88D-CD24-DC57-143E-8E2DCCB04BA9}"/>
+              </a:ext>
+            </a:extLst>
+          </p:cNvPr>
+          <p:cNvSpPr txBox="1"/>
+          <p:nvPr/>
+        </p:nvSpPr>
+        <p:spPr>
+          <a:xfrm>
+            <a:off x="8563052" y="1966965"/>
+            <a:ext cx="3530303" cy="369332"/>
+          </a:xfrm>
+          <a:prstGeom prst="rect">
+            <a:avLst/>
+          </a:prstGeom>
+          <a:solidFill>
+            <a:srgbClr val="FF69B4">
+              <a:alpha val="37000"/>
+            </a:srgbClr>
+          </a:solidFill>
+        </p:spPr>
+        <p:txBody>
+          <a:bodyPr wrap="square" rtlCol="0">
+            <a:spAutoFit/>
+          </a:bodyPr>
+          <a:lstStyle/>
+          <a:p>
+            <a:r>
+              <a:rPr lang="fr-FR" dirty="0"/>
+              <a:t>...et le produit B le reste de l’année.</a:t>
+            </a:r>
+          </a:p>
+        </p:txBody>
+      </p:sp>
+      <p:sp>
+        <p:nvSpPr>
+          <p:cNvPr id="21" name="ZoneTexte 20">
+            <a:extLst>
+              <a:ext uri="{FF2B5EF4-FFF2-40B4-BE49-F238E27FC236}">
+                <a16:creationId xmlns:a16="http://schemas.microsoft.com/office/drawing/2014/main" id="{6F0DC31E-C171-7437-53A0-908BA5E3AA19}"/>
+              </a:ext>
+            </a:extLst>
+          </p:cNvPr>
+          <p:cNvSpPr txBox="1"/>
+          <p:nvPr/>
+        </p:nvSpPr>
+        <p:spPr>
+          <a:xfrm>
+            <a:off x="555214" y="1969666"/>
+            <a:ext cx="266420" cy="430887"/>
+          </a:xfrm>
+          <a:prstGeom prst="rect">
+            <a:avLst/>
+          </a:prstGeom>
+          <a:noFill/>
+        </p:spPr>
+        <p:txBody>
+          <a:bodyPr wrap="none" rtlCol="0">
+            <a:spAutoFit/>
+          </a:bodyPr>
+          <a:lstStyle/>
+          <a:p>
+            <a:r>
+              <a:rPr lang="fr-FR" sz="1100" dirty="0"/>
+              <a:t>A</a:t>
+            </a:r>
+          </a:p>
+          <a:p>
+            <a:r>
+              <a:rPr lang="fr-FR" sz="1100" dirty="0"/>
+              <a:t>B</a:t>
+            </a:r>
+          </a:p>
+        </p:txBody>
+      </p:sp>
+      <p:sp>
+        <p:nvSpPr>
+          <p:cNvPr id="22" name="ZoneTexte 21">
+            <a:extLst>
+              <a:ext uri="{FF2B5EF4-FFF2-40B4-BE49-F238E27FC236}">
+                <a16:creationId xmlns:a16="http://schemas.microsoft.com/office/drawing/2014/main" id="{0164920C-F339-A120-95C6-C8F0D16580E5}"/>
+              </a:ext>
+            </a:extLst>
+          </p:cNvPr>
+          <p:cNvSpPr txBox="1"/>
+          <p:nvPr/>
+        </p:nvSpPr>
+        <p:spPr>
+          <a:xfrm>
+            <a:off x="0" y="6524991"/>
+            <a:ext cx="4903907" cy="230832"/>
+          </a:xfrm>
+          <a:prstGeom prst="rect">
+            <a:avLst/>
+          </a:prstGeom>
+          <a:noFill/>
+        </p:spPr>
+        <p:txBody>
+          <a:bodyPr wrap="none" rtlCol="0">
+            <a:spAutoFit/>
+          </a:bodyPr>
+          <a:lstStyle/>
+          <a:p>
+            <a:r>
+              <a:rPr lang="fr-FR" sz="900" dirty="0"/>
+              <a:t>* Il manque des données pour 23 jours de l’année 2019. Une imputation par moyenne a été réalisée. </a:t>
             </a:r>
           </a:p>
         </p:txBody>
@@ -3428,7 +4008,7 @@
     </p:spTree>
     <p:extLst>
       <p:ext uri="{BB962C8B-B14F-4D97-AF65-F5344CB8AC3E}">
-        <p14:creationId xmlns:p14="http://schemas.microsoft.com/office/powerpoint/2010/main" val="2140408922"/>
+        <p14:creationId xmlns:p14="http://schemas.microsoft.com/office/powerpoint/2010/main" val="1926286280"/>
       </p:ext>
     </p:extLst>
   </p:cSld>
@@ -3457,72 +4037,422 @@
       </p:grpSpPr>
       <p:pic>
         <p:nvPicPr>
-          <p:cNvPr id="2050" name="Picture 2" descr="meteo">
-            <a:extLst>
-              <a:ext uri="{FF2B5EF4-FFF2-40B4-BE49-F238E27FC236}">
-                <a16:creationId xmlns:a16="http://schemas.microsoft.com/office/drawing/2014/main" id="{E4343ACA-578E-7D41-8C11-E542E8DB1F97}"/>
+          <p:cNvPr id="3" name="Image 2">
+            <a:extLst>
+              <a:ext uri="{FF2B5EF4-FFF2-40B4-BE49-F238E27FC236}">
+                <a16:creationId xmlns:a16="http://schemas.microsoft.com/office/drawing/2014/main" id="{06AF81FF-D9D6-7EF9-69B2-9D2DD9174C9D}"/>
               </a:ext>
             </a:extLst>
           </p:cNvPr>
           <p:cNvPicPr>
-            <a:picLocks noChangeAspect="1" noChangeArrowheads="1"/>
+            <a:picLocks noChangeAspect="1"/>
           </p:cNvPicPr>
           <p:nvPr/>
         </p:nvPicPr>
         <p:blipFill>
           <a:blip r:embed="rId2">
+            <a:duotone>
+              <a:schemeClr val="accent1">
+                <a:shade val="45000"/>
+                <a:satMod val="135000"/>
+              </a:schemeClr>
+              <a:prstClr val="white"/>
+            </a:duotone>
             <a:extLst>
               <a:ext uri="{BEBA8EAE-BF5A-486C-A8C5-ECC9F3942E4B}">
                 <a14:imgProps xmlns:a14="http://schemas.microsoft.com/office/drawing/2010/main">
                   <a14:imgLayer r:embed="rId3">
                     <a14:imgEffect>
-                      <a14:backgroundRemoval t="9940" b="89458" l="6667" r="90000">
-                        <a14:foregroundMark x1="10000" y1="54819" x2="7667" y2="53916"/>
-                        <a14:foregroundMark x1="8000" y1="57831" x2="6667" y2="58434"/>
-                        <a14:backgroundMark x1="4667" y1="6325" x2="11667" y2="16867"/>
-                        <a14:backgroundMark x1="11667" y1="16867" x2="16500" y2="19880"/>
-                        <a14:backgroundMark x1="57333" y1="14759" x2="65667" y2="12349"/>
-                        <a14:backgroundMark x1="65667" y1="12349" x2="68833" y2="12651"/>
-                        <a14:backgroundMark x1="7667" y1="53916" x2="7000" y2="53916"/>
+                      <a14:backgroundRemoval t="4613" b="92394" l="4267" r="97467">
+                        <a14:foregroundMark x1="14133" y1="34663" x2="5733" y2="34663"/>
+                        <a14:foregroundMark x1="5733" y1="34663" x2="5733" y2="34663"/>
+                        <a14:foregroundMark x1="7467" y1="32668" x2="4588" y2="32780"/>
+                        <a14:foregroundMark x1="33600" y1="50249" x2="30533" y2="61222"/>
+                        <a14:foregroundMark x1="16533" y1="33167" x2="6400" y2="33416"/>
+                        <a14:foregroundMark x1="6400" y1="33416" x2="6267" y2="35910"/>
+                        <a14:foregroundMark x1="46667" y1="16459" x2="49467" y2="8853"/>
+                        <a14:foregroundMark x1="69867" y1="33541" x2="80400" y2="69950"/>
+                        <a14:foregroundMark x1="80400" y1="69950" x2="90000" y2="73940"/>
+                        <a14:foregroundMark x1="90000" y1="73940" x2="98133" y2="80673"/>
+                        <a14:foregroundMark x1="98133" y1="80673" x2="96400" y2="87781"/>
+                        <a14:foregroundMark x1="96400" y1="87781" x2="90133" y2="92269"/>
+                        <a14:foregroundMark x1="90133" y1="92269" x2="89467" y2="84165"/>
+                        <a14:foregroundMark x1="89467" y1="84165" x2="91467" y2="79426"/>
+                        <a14:foregroundMark x1="89333" y1="80923" x2="94000" y2="86409"/>
+                        <a14:foregroundMark x1="94000" y1="86409" x2="87600" y2="86534"/>
+                        <a14:foregroundMark x1="89467" y1="86534" x2="89333" y2="87406"/>
+                        <a14:foregroundMark x1="57333" y1="76060" x2="65067" y2="76933"/>
+                        <a14:foregroundMark x1="65067" y1="76933" x2="58133" y2="74190"/>
+                        <a14:foregroundMark x1="58133" y1="74190" x2="57867" y2="74813"/>
+                        <a14:foregroundMark x1="60267" y1="73566" x2="66933" y2="77681"/>
+                        <a14:foregroundMark x1="66933" y1="77681" x2="68267" y2="76808"/>
+                        <a14:foregroundMark x1="38400" y1="10100" x2="28933" y2="17082"/>
+                        <a14:foregroundMark x1="28933" y1="17082" x2="19867" y2="19950"/>
+                        <a14:foregroundMark x1="19867" y1="19950" x2="12000" y2="18703"/>
+                        <a14:foregroundMark x1="12000" y1="18703" x2="2842" y2="29715"/>
+                        <a14:foregroundMark x1="3077" y1="36250" x2="3200" y2="38155"/>
+                        <a14:foregroundMark x1="2667" y1="29925" x2="2710" y2="30586"/>
+                        <a14:foregroundMark x1="3200" y1="38155" x2="18800" y2="47132"/>
+                        <a14:foregroundMark x1="18800" y1="47132" x2="27200" y2="50374"/>
+                        <a14:foregroundMark x1="27200" y1="50374" x2="28933" y2="57731"/>
+                        <a14:foregroundMark x1="28933" y1="57731" x2="22933" y2="63716"/>
+                        <a14:foregroundMark x1="22933" y1="63716" x2="17200" y2="53865"/>
+                        <a14:foregroundMark x1="17200" y1="53865" x2="18000" y2="45761"/>
+                        <a14:foregroundMark x1="18000" y1="45761" x2="14800" y2="53865"/>
+                        <a14:foregroundMark x1="14800" y1="53865" x2="15467" y2="70075"/>
+                        <a14:foregroundMark x1="15467" y1="70075" x2="19467" y2="78055"/>
+                        <a14:foregroundMark x1="19467" y1="78055" x2="44800" y2="84913"/>
+                        <a14:foregroundMark x1="44800" y1="84913" x2="60933" y2="83791"/>
+                        <a14:foregroundMark x1="60933" y1="83791" x2="80400" y2="76185"/>
+                        <a14:foregroundMark x1="80400" y1="76185" x2="86267" y2="70948"/>
+                        <a14:foregroundMark x1="86267" y1="70948" x2="82800" y2="63342"/>
+                        <a14:foregroundMark x1="82800" y1="63342" x2="86533" y2="28429"/>
+                        <a14:foregroundMark x1="86533" y1="28429" x2="79067" y2="23815"/>
+                        <a14:foregroundMark x1="79067" y1="23815" x2="64533" y2="20574"/>
+                        <a14:foregroundMark x1="64533" y1="20574" x2="64000" y2="13217"/>
+                        <a14:foregroundMark x1="64000" y1="13217" x2="56133" y2="4613"/>
+                        <a14:foregroundMark x1="56133" y1="4613" x2="46933" y2="1746"/>
+                        <a14:foregroundMark x1="46933" y1="1746" x2="39600" y2="4738"/>
+                        <a14:foregroundMark x1="39600" y1="4738" x2="36133" y2="11097"/>
+                        <a14:foregroundMark x1="36133" y1="11097" x2="35867" y2="11845"/>
+                        <a14:foregroundMark x1="62133" y1="12095" x2="66133" y2="16958"/>
+                        <a14:foregroundMark x1="24533" y1="25935" x2="14133" y2="27182"/>
+                        <a14:foregroundMark x1="72133" y1="73317" x2="62533" y2="79052"/>
+                        <a14:foregroundMark x1="85333" y1="77681" x2="82533" y2="85411"/>
+                        <a14:foregroundMark x1="82533" y1="85411" x2="83867" y2="93890"/>
+                        <a14:foregroundMark x1="83867" y1="93890" x2="91067" y2="96010"/>
+                        <a14:foregroundMark x1="91067" y1="96010" x2="97467" y2="92394"/>
+                        <a14:foregroundMark x1="97467" y1="92394" x2="94267" y2="87531"/>
+                        <a14:foregroundMark x1="46133" y1="86160" x2="53333" y2="90399"/>
+                        <a14:foregroundMark x1="53333" y1="90399" x2="57333" y2="83292"/>
+                        <a14:foregroundMark x1="57333" y1="83292" x2="56800" y2="82918"/>
+                        <a14:foregroundMark x1="52933" y1="87905" x2="41600" y2="89027"/>
+                        <a14:foregroundMark x1="41600" y1="89027" x2="32800" y2="87656"/>
+                        <a14:foregroundMark x1="32800" y1="87656" x2="25333" y2="84165"/>
+                        <a14:foregroundMark x1="25333" y1="84165" x2="20133" y2="78554"/>
+                        <a14:foregroundMark x1="20133" y1="78554" x2="27200" y2="73317"/>
+                        <a14:foregroundMark x1="27200" y1="73317" x2="27467" y2="72569"/>
+                        <a14:foregroundMark x1="84667" y1="27930" x2="92267" y2="27805"/>
+                        <a14:foregroundMark x1="92267" y1="27805" x2="89333" y2="32045"/>
+                        <a14:backgroundMark x1="267" y1="32045" x2="1333" y2="31671"/>
+                        <a14:backgroundMark x1="800" y1="31297" x2="2133" y2="31546"/>
+                        <a14:backgroundMark x1="2000" y1="30673" x2="2800" y2="36284"/>
                       </a14:backgroundRemoval>
                     </a14:imgEffect>
                   </a14:imgLayer>
                 </a14:imgProps>
               </a:ext>
-              <a:ext uri="{28A0092B-C50C-407E-A947-70E740481C1C}">
-                <a14:useLocalDpi xmlns:a14="http://schemas.microsoft.com/office/drawing/2010/main" val="0"/>
-              </a:ext>
             </a:extLst>
           </a:blip>
-          <a:srcRect/>
           <a:stretch>
             <a:fillRect/>
           </a:stretch>
         </p:blipFill>
-        <p:spPr bwMode="auto">
+        <p:spPr>
           <a:xfrm>
-            <a:off x="5008234" y="-537156"/>
-            <a:ext cx="7620000" cy="4216400"/>
+            <a:off x="-110157" y="413538"/>
+            <a:ext cx="6206157" cy="6636450"/>
+          </a:xfrm>
+          <a:prstGeom prst="rect">
+            <a:avLst/>
+          </a:prstGeom>
+        </p:spPr>
+      </p:pic>
+      <p:sp>
+        <p:nvSpPr>
+          <p:cNvPr id="11" name="ZoneTexte 10">
+            <a:extLst>
+              <a:ext uri="{FF2B5EF4-FFF2-40B4-BE49-F238E27FC236}">
+                <a16:creationId xmlns:a16="http://schemas.microsoft.com/office/drawing/2014/main" id="{FFB91A0B-FFEF-73F9-9132-484FAA2E36C7}"/>
+              </a:ext>
+            </a:extLst>
+          </p:cNvPr>
+          <p:cNvSpPr txBox="1"/>
+          <p:nvPr/>
+        </p:nvSpPr>
+        <p:spPr>
+          <a:xfrm>
+            <a:off x="7206010" y="3046741"/>
+            <a:ext cx="4149507" cy="2215991"/>
+          </a:xfrm>
+          <a:prstGeom prst="rect">
+            <a:avLst/>
+          </a:prstGeom>
+          <a:solidFill>
+            <a:schemeClr val="bg1">
+              <a:alpha val="66040"/>
+            </a:schemeClr>
+          </a:solidFill>
+        </p:spPr>
+        <p:txBody>
+          <a:bodyPr wrap="square" rtlCol="0">
+            <a:spAutoFit/>
+          </a:bodyPr>
+          <a:lstStyle/>
+          <a:p>
+            <a:pPr algn="just"/>
+            <a:r>
+              <a:rPr lang="fr-FR" dirty="0"/>
+              <a:t>En se basant sur </a:t>
+            </a:r>
+            <a:r>
+              <a:rPr lang="fr-FR" sz="2400" dirty="0">
+                <a:solidFill>
+                  <a:schemeClr val="accent1"/>
+                </a:solidFill>
+              </a:rPr>
+              <a:t>la force des vents</a:t>
+            </a:r>
+            <a:r>
+              <a:rPr lang="fr-FR" dirty="0"/>
+              <a:t>, il y a de fortes probabilités que le fichier soit celui lié aux ventes du magasin </a:t>
+            </a:r>
+            <a:r>
+              <a:rPr lang="fr-FR" sz="2400" dirty="0">
+                <a:solidFill>
+                  <a:schemeClr val="accent1"/>
+                </a:solidFill>
+              </a:rPr>
+              <a:t>marseillais :</a:t>
+            </a:r>
+            <a:endParaRPr lang="fr-FR" dirty="0">
+              <a:solidFill>
+                <a:schemeClr val="accent1"/>
+              </a:solidFill>
+            </a:endParaRPr>
+          </a:p>
+          <a:p>
+            <a:pPr algn="just"/>
+            <a:endParaRPr lang="fr-FR" dirty="0">
+              <a:solidFill>
+                <a:schemeClr val="accent1"/>
+              </a:solidFill>
+            </a:endParaRPr>
+          </a:p>
+          <a:p>
+            <a:pPr algn="just"/>
+            <a:r>
+              <a:rPr lang="fr-FR" dirty="0"/>
+              <a:t>les ventes des produits baissent lorsque le vent souffle plus fort.</a:t>
+            </a:r>
+          </a:p>
+        </p:txBody>
+      </p:sp>
+      <p:sp>
+        <p:nvSpPr>
+          <p:cNvPr id="13" name="ZoneTexte 12">
+            <a:extLst>
+              <a:ext uri="{FF2B5EF4-FFF2-40B4-BE49-F238E27FC236}">
+                <a16:creationId xmlns:a16="http://schemas.microsoft.com/office/drawing/2014/main" id="{A4A05A66-1587-FAAD-E9A9-9FDDB7951D30}"/>
+              </a:ext>
+            </a:extLst>
+          </p:cNvPr>
+          <p:cNvSpPr txBox="1"/>
+          <p:nvPr/>
+        </p:nvSpPr>
+        <p:spPr>
+          <a:xfrm>
+            <a:off x="2167421" y="-5401"/>
+            <a:ext cx="8487836" cy="646331"/>
           </a:xfrm>
           <a:prstGeom prst="rect">
             <a:avLst/>
           </a:prstGeom>
           <a:noFill/>
-          <a:extLst>
-            <a:ext uri="{909E8E84-426E-40DD-AFC4-6F175D3DCCD1}">
-              <a14:hiddenFill xmlns:a14="http://schemas.microsoft.com/office/drawing/2010/main">
-                <a:solidFill>
-                  <a:srgbClr val="FFFFFF"/>
-                </a:solidFill>
-              </a14:hiddenFill>
-            </a:ext>
-          </a:extLst>
+        </p:spPr>
+        <p:txBody>
+          <a:bodyPr wrap="none" rtlCol="0">
+            <a:spAutoFit/>
+          </a:bodyPr>
+          <a:lstStyle/>
+          <a:p>
+            <a:r>
+              <a:rPr lang="fr-FR" sz="3600" dirty="0"/>
+              <a:t>A quelle ville appartient le fichier de ventes?</a:t>
+            </a:r>
+          </a:p>
+        </p:txBody>
+      </p:sp>
+      <p:pic>
+        <p:nvPicPr>
+          <p:cNvPr id="19" name="Image 18">
+            <a:extLst>
+              <a:ext uri="{FF2B5EF4-FFF2-40B4-BE49-F238E27FC236}">
+                <a16:creationId xmlns:a16="http://schemas.microsoft.com/office/drawing/2014/main" id="{269916A1-618B-61E1-B442-60FADEDD3304}"/>
+              </a:ext>
+            </a:extLst>
+          </p:cNvPr>
+          <p:cNvPicPr>
+            <a:picLocks noChangeAspect="1"/>
+          </p:cNvPicPr>
+          <p:nvPr/>
+        </p:nvPicPr>
+        <p:blipFill>
+          <a:blip r:embed="rId4"/>
+          <a:srcRect/>
+          <a:stretch/>
+        </p:blipFill>
+        <p:spPr>
+          <a:xfrm>
+            <a:off x="2293030" y="1809119"/>
+            <a:ext cx="1399781" cy="2917145"/>
+          </a:xfrm>
+          <a:prstGeom prst="rect">
+            <a:avLst/>
+          </a:prstGeom>
+        </p:spPr>
+      </p:pic>
+      <p:pic>
+        <p:nvPicPr>
+          <p:cNvPr id="21" name="Image 20">
+            <a:extLst>
+              <a:ext uri="{FF2B5EF4-FFF2-40B4-BE49-F238E27FC236}">
+                <a16:creationId xmlns:a16="http://schemas.microsoft.com/office/drawing/2014/main" id="{0A5C9B27-A8B2-95C7-DA50-6198DB2F073A}"/>
+              </a:ext>
+            </a:extLst>
+          </p:cNvPr>
+          <p:cNvPicPr>
+            <a:picLocks noChangeAspect="1"/>
+          </p:cNvPicPr>
+          <p:nvPr/>
+        </p:nvPicPr>
+        <p:blipFill>
+          <a:blip r:embed="rId5"/>
+          <a:stretch>
+            <a:fillRect/>
+          </a:stretch>
+        </p:blipFill>
+        <p:spPr>
+          <a:xfrm>
+            <a:off x="5477796" y="1059869"/>
+            <a:ext cx="2327787" cy="2327787"/>
+          </a:xfrm>
+          <a:prstGeom prst="rect">
+            <a:avLst/>
+          </a:prstGeom>
+        </p:spPr>
+      </p:pic>
+      <p:pic>
+        <p:nvPicPr>
+          <p:cNvPr id="23" name="Image 22">
+            <a:extLst>
+              <a:ext uri="{FF2B5EF4-FFF2-40B4-BE49-F238E27FC236}">
+                <a16:creationId xmlns:a16="http://schemas.microsoft.com/office/drawing/2014/main" id="{4667AB2E-4B20-99C8-06ED-B2DA569CCFCD}"/>
+              </a:ext>
+            </a:extLst>
+          </p:cNvPr>
+          <p:cNvPicPr>
+            <a:picLocks noChangeAspect="1"/>
+          </p:cNvPicPr>
+          <p:nvPr/>
+        </p:nvPicPr>
+        <p:blipFill>
+          <a:blip r:embed="rId6"/>
+          <a:stretch>
+            <a:fillRect/>
+          </a:stretch>
+        </p:blipFill>
+        <p:spPr>
+          <a:xfrm rot="6955471">
+            <a:off x="4527334" y="3999003"/>
+            <a:ext cx="2328427" cy="2439635"/>
+          </a:xfrm>
+          <a:prstGeom prst="rect">
+            <a:avLst/>
+          </a:prstGeom>
+        </p:spPr>
+      </p:pic>
+      <p:sp>
+        <p:nvSpPr>
+          <p:cNvPr id="24" name="Forme en L 23">
+            <a:extLst>
+              <a:ext uri="{FF2B5EF4-FFF2-40B4-BE49-F238E27FC236}">
+                <a16:creationId xmlns:a16="http://schemas.microsoft.com/office/drawing/2014/main" id="{B821F162-F66B-6925-E95E-078CF2F84E66}"/>
+              </a:ext>
+            </a:extLst>
+          </p:cNvPr>
+          <p:cNvSpPr/>
+          <p:nvPr/>
+        </p:nvSpPr>
+        <p:spPr>
+          <a:xfrm>
+            <a:off x="7176493" y="4219670"/>
+            <a:ext cx="1502605" cy="211047"/>
+          </a:xfrm>
+          <a:prstGeom prst="corner">
+            <a:avLst>
+              <a:gd name="adj1" fmla="val 46314"/>
+              <a:gd name="adj2" fmla="val 48157"/>
+            </a:avLst>
+          </a:prstGeom>
+          <a:solidFill>
+            <a:srgbClr val="C8C837">
+              <a:alpha val="64000"/>
+            </a:srgbClr>
+          </a:solidFill>
+          <a:ln>
+            <a:noFill/>
+          </a:ln>
+        </p:spPr>
+        <p:style>
+          <a:lnRef idx="2">
+            <a:schemeClr val="accent1">
+              <a:shade val="50000"/>
+            </a:schemeClr>
+          </a:lnRef>
+          <a:fillRef idx="1">
+            <a:schemeClr val="accent1"/>
+          </a:fillRef>
+          <a:effectRef idx="0">
+            <a:schemeClr val="accent1"/>
+          </a:effectRef>
+          <a:fontRef idx="minor">
+            <a:schemeClr val="lt1"/>
+          </a:fontRef>
+        </p:style>
+        <p:txBody>
+          <a:bodyPr rtlCol="0" anchor="ctr"/>
+          <a:lstStyle/>
+          <a:p>
+            <a:pPr algn="ctr"/>
+            <a:endParaRPr lang="fr-FR" dirty="0"/>
+          </a:p>
+        </p:txBody>
+      </p:sp>
+      <p:pic>
+        <p:nvPicPr>
+          <p:cNvPr id="28" name="Image 27">
+            <a:extLst>
+              <a:ext uri="{FF2B5EF4-FFF2-40B4-BE49-F238E27FC236}">
+                <a16:creationId xmlns:a16="http://schemas.microsoft.com/office/drawing/2014/main" id="{2567DD09-D9F5-7BC4-A51F-F013335E8741}"/>
+              </a:ext>
+            </a:extLst>
+          </p:cNvPr>
+          <p:cNvPicPr>
+            <a:picLocks noChangeAspect="1"/>
+          </p:cNvPicPr>
+          <p:nvPr/>
+        </p:nvPicPr>
+        <p:blipFill>
+          <a:blip r:embed="rId7"/>
+          <a:stretch>
+            <a:fillRect/>
+          </a:stretch>
+        </p:blipFill>
+        <p:spPr>
+          <a:xfrm>
+            <a:off x="9683885" y="4743819"/>
+            <a:ext cx="1472412" cy="1472412"/>
+          </a:xfrm>
+          <a:prstGeom prst="rect">
+            <a:avLst/>
+          </a:prstGeom>
         </p:spPr>
       </p:pic>
     </p:spTree>
     <p:extLst>
       <p:ext uri="{BB962C8B-B14F-4D97-AF65-F5344CB8AC3E}">
-        <p14:creationId xmlns:p14="http://schemas.microsoft.com/office/powerpoint/2010/main" val="577301080"/>
+        <p14:creationId xmlns:p14="http://schemas.microsoft.com/office/powerpoint/2010/main" val="1837717023"/>
       </p:ext>
     </p:extLst>
   </p:cSld>
@@ -3551,57 +4481,300 @@
       </p:grpSpPr>
       <p:sp>
         <p:nvSpPr>
-          <p:cNvPr id="2" name="Rectangle 1">
-            <a:extLst>
-              <a:ext uri="{FF2B5EF4-FFF2-40B4-BE49-F238E27FC236}">
-                <a16:creationId xmlns:a16="http://schemas.microsoft.com/office/drawing/2014/main" id="{F65EDDCF-F0BF-38DD-194A-38DCD85D2983}"/>
-              </a:ext>
-            </a:extLst>
-          </p:cNvPr>
-          <p:cNvSpPr/>
+          <p:cNvPr id="2" name="ZoneTexte 1">
+            <a:extLst>
+              <a:ext uri="{FF2B5EF4-FFF2-40B4-BE49-F238E27FC236}">
+                <a16:creationId xmlns:a16="http://schemas.microsoft.com/office/drawing/2014/main" id="{C350154F-A9B0-2B0E-82D6-CE2F9B8FB7AF}"/>
+              </a:ext>
+            </a:extLst>
+          </p:cNvPr>
+          <p:cNvSpPr txBox="1"/>
           <p:nvPr/>
         </p:nvSpPr>
         <p:spPr>
           <a:xfrm>
-            <a:off x="0" y="3285161"/>
-            <a:ext cx="12192000" cy="287677"/>
+            <a:off x="3915563" y="-5401"/>
+            <a:ext cx="4360874" cy="646331"/>
+          </a:xfrm>
+          <a:prstGeom prst="rect">
+            <a:avLst/>
+          </a:prstGeom>
+          <a:noFill/>
+        </p:spPr>
+        <p:txBody>
+          <a:bodyPr wrap="none" rtlCol="0">
+            <a:spAutoFit/>
+          </a:bodyPr>
+          <a:lstStyle/>
+          <a:p>
+            <a:r>
+              <a:rPr lang="fr-FR" sz="3600" dirty="0"/>
+              <a:t>La météo et les ventes</a:t>
+            </a:r>
+          </a:p>
+        </p:txBody>
+      </p:sp>
+      <p:sp>
+        <p:nvSpPr>
+          <p:cNvPr id="3" name="ZoneTexte 2">
+            <a:extLst>
+              <a:ext uri="{FF2B5EF4-FFF2-40B4-BE49-F238E27FC236}">
+                <a16:creationId xmlns:a16="http://schemas.microsoft.com/office/drawing/2014/main" id="{1A4469FD-9B4A-10C0-DC60-FF2F7053B66A}"/>
+              </a:ext>
+            </a:extLst>
+          </p:cNvPr>
+          <p:cNvSpPr txBox="1"/>
+          <p:nvPr/>
+        </p:nvSpPr>
+        <p:spPr>
+          <a:xfrm>
+            <a:off x="452283" y="1473379"/>
+            <a:ext cx="4925960" cy="923330"/>
+          </a:xfrm>
+          <a:prstGeom prst="rect">
+            <a:avLst/>
+          </a:prstGeom>
+          <a:solidFill>
+            <a:schemeClr val="accent1">
+              <a:alpha val="76000"/>
+            </a:schemeClr>
+          </a:solidFill>
+        </p:spPr>
+        <p:txBody>
+          <a:bodyPr wrap="square" rtlCol="0">
+            <a:spAutoFit/>
+          </a:bodyPr>
+          <a:lstStyle/>
+          <a:p>
+            <a:pPr algn="just"/>
+            <a:r>
+              <a:rPr lang="fr-FR" dirty="0">
+                <a:solidFill>
+                  <a:schemeClr val="bg1"/>
+                </a:solidFill>
+              </a:rPr>
+              <a:t>On observe un lien entre les ventes et la météo.</a:t>
+            </a:r>
+          </a:p>
+          <a:p>
+            <a:pPr algn="just"/>
+            <a:r>
+              <a:rPr lang="fr-FR" dirty="0">
+                <a:solidFill>
+                  <a:schemeClr val="bg1"/>
+                </a:solidFill>
+              </a:rPr>
+              <a:t>Lorsque la météo est qualifiée d’idéale, le produit B se vend le mieux alors que le A non.</a:t>
+            </a:r>
+          </a:p>
+        </p:txBody>
+      </p:sp>
+      <p:pic>
+        <p:nvPicPr>
+          <p:cNvPr id="5" name="Image 4">
+            <a:extLst>
+              <a:ext uri="{FF2B5EF4-FFF2-40B4-BE49-F238E27FC236}">
+                <a16:creationId xmlns:a16="http://schemas.microsoft.com/office/drawing/2014/main" id="{6952D872-514E-7E91-25EA-C6465DCF105C}"/>
+              </a:ext>
+            </a:extLst>
+          </p:cNvPr>
+          <p:cNvPicPr>
+            <a:picLocks noChangeAspect="1"/>
+          </p:cNvPicPr>
+          <p:nvPr/>
+        </p:nvPicPr>
+        <p:blipFill>
+          <a:blip r:embed="rId2"/>
+          <a:stretch>
+            <a:fillRect/>
+          </a:stretch>
+        </p:blipFill>
+        <p:spPr>
+          <a:xfrm>
+            <a:off x="5555226" y="2217349"/>
+            <a:ext cx="6636774" cy="4424516"/>
           </a:xfrm>
           <a:prstGeom prst="rect">
             <a:avLst/>
           </a:prstGeom>
         </p:spPr>
-        <p:style>
-          <a:lnRef idx="2">
+      </p:pic>
+      <p:pic>
+        <p:nvPicPr>
+          <p:cNvPr id="2050" name="Picture 2" descr="meteo">
+            <a:extLst>
+              <a:ext uri="{FF2B5EF4-FFF2-40B4-BE49-F238E27FC236}">
+                <a16:creationId xmlns:a16="http://schemas.microsoft.com/office/drawing/2014/main" id="{E4343ACA-578E-7D41-8C11-E542E8DB1F97}"/>
+              </a:ext>
+            </a:extLst>
+          </p:cNvPr>
+          <p:cNvPicPr>
+            <a:picLocks noChangeAspect="1" noChangeArrowheads="1"/>
+          </p:cNvPicPr>
+          <p:nvPr/>
+        </p:nvPicPr>
+        <p:blipFill rotWithShape="1">
+          <a:blip r:embed="rId3">
+            <a:extLst>
+              <a:ext uri="{BEBA8EAE-BF5A-486C-A8C5-ECC9F3942E4B}">
+                <a14:imgProps xmlns:a14="http://schemas.microsoft.com/office/drawing/2010/main">
+                  <a14:imgLayer r:embed="rId4">
+                    <a14:imgEffect>
+                      <a14:backgroundRemoval t="9940" b="89458" l="6667" r="90000">
+                        <a14:foregroundMark x1="10000" y1="54819" x2="7667" y2="53916"/>
+                        <a14:foregroundMark x1="8000" y1="57831" x2="6667" y2="58434"/>
+                        <a14:backgroundMark x1="4667" y1="6325" x2="11667" y2="16867"/>
+                        <a14:backgroundMark x1="11667" y1="16867" x2="16500" y2="19880"/>
+                        <a14:backgroundMark x1="57333" y1="14759" x2="65667" y2="12349"/>
+                        <a14:backgroundMark x1="65667" y1="12349" x2="68833" y2="12651"/>
+                        <a14:backgroundMark x1="7667" y1="53916" x2="7000" y2="53916"/>
+                      </a14:backgroundRemoval>
+                    </a14:imgEffect>
+                  </a14:imgLayer>
+                </a14:imgProps>
+              </a:ext>
+              <a:ext uri="{28A0092B-C50C-407E-A947-70E740481C1C}">
+                <a14:useLocalDpi xmlns:a14="http://schemas.microsoft.com/office/drawing/2010/main" val="0"/>
+              </a:ext>
+            </a:extLst>
+          </a:blip>
+          <a:srcRect l="6370" t="10885" r="9290" b="14493"/>
+          <a:stretch/>
+        </p:blipFill>
+        <p:spPr bwMode="auto">
+          <a:xfrm>
+            <a:off x="452282" y="3061904"/>
+            <a:ext cx="4513007" cy="2209442"/>
+          </a:xfrm>
+          <a:prstGeom prst="rect">
+            <a:avLst/>
+          </a:prstGeom>
+          <a:noFill/>
+          <a:extLst>
+            <a:ext uri="{909E8E84-426E-40DD-AFC4-6F175D3DCCD1}">
+              <a14:hiddenFill xmlns:a14="http://schemas.microsoft.com/office/drawing/2010/main">
+                <a:solidFill>
+                  <a:srgbClr val="FFFFFF"/>
+                </a:solidFill>
+              </a14:hiddenFill>
+            </a:ext>
+          </a:extLst>
+        </p:spPr>
+      </p:pic>
+      <p:sp>
+        <p:nvSpPr>
+          <p:cNvPr id="7" name="ZoneTexte 6">
+            <a:extLst>
+              <a:ext uri="{FF2B5EF4-FFF2-40B4-BE49-F238E27FC236}">
+                <a16:creationId xmlns:a16="http://schemas.microsoft.com/office/drawing/2014/main" id="{77918AA8-00A6-1BF9-CCBF-37632E72ACC9}"/>
+              </a:ext>
+            </a:extLst>
+          </p:cNvPr>
+          <p:cNvSpPr txBox="1"/>
+          <p:nvPr/>
+        </p:nvSpPr>
+        <p:spPr>
+          <a:xfrm>
+            <a:off x="452282" y="5936542"/>
+            <a:ext cx="4925961" cy="646331"/>
+          </a:xfrm>
+          <a:prstGeom prst="rect">
+            <a:avLst/>
+          </a:prstGeom>
+          <a:solidFill>
             <a:schemeClr val="accent1">
-              <a:shade val="50000"/>
+              <a:alpha val="75323"/>
             </a:schemeClr>
-          </a:lnRef>
-          <a:fillRef idx="1">
-            <a:schemeClr val="accent1"/>
-          </a:fillRef>
-          <a:effectRef idx="0">
-            <a:schemeClr val="accent1"/>
-          </a:effectRef>
-          <a:fontRef idx="minor">
-            <a:schemeClr val="lt1"/>
-          </a:fontRef>
-        </p:style>
-        <p:txBody>
-          <a:bodyPr rtlCol="0" anchor="ctr"/>
-          <a:lstStyle/>
-          <a:p>
-            <a:pPr algn="ctr"/>
+          </a:solidFill>
+        </p:spPr>
+        <p:txBody>
+          <a:bodyPr wrap="square">
+            <a:spAutoFit/>
+          </a:bodyPr>
+          <a:lstStyle/>
+          <a:p>
+            <a:pPr algn="just"/>
+            <a:r>
+              <a:rPr lang="fr-FR" dirty="0">
+                <a:solidFill>
+                  <a:schemeClr val="bg1"/>
+                </a:solidFill>
+              </a:rPr>
+              <a:t>La tendance s’inverse au fur et à mesure que la météo se dégrade.</a:t>
+            </a:r>
+          </a:p>
+        </p:txBody>
+      </p:sp>
+      <p:sp>
+        <p:nvSpPr>
+          <p:cNvPr id="8" name="ZoneTexte 7">
+            <a:extLst>
+              <a:ext uri="{FF2B5EF4-FFF2-40B4-BE49-F238E27FC236}">
+                <a16:creationId xmlns:a16="http://schemas.microsoft.com/office/drawing/2014/main" id="{823E1663-9B08-EEF4-D343-B20669A0088B}"/>
+              </a:ext>
+            </a:extLst>
+          </p:cNvPr>
+          <p:cNvSpPr txBox="1"/>
+          <p:nvPr/>
+        </p:nvSpPr>
+        <p:spPr>
+          <a:xfrm>
+            <a:off x="6469626" y="1473379"/>
+            <a:ext cx="4100051" cy="646331"/>
+          </a:xfrm>
+          <a:prstGeom prst="rect">
+            <a:avLst/>
+          </a:prstGeom>
+          <a:noFill/>
+        </p:spPr>
+        <p:txBody>
+          <a:bodyPr wrap="square">
+            <a:spAutoFit/>
+          </a:bodyPr>
+          <a:lstStyle/>
+          <a:p>
+            <a:pPr algn="just"/>
             <a:r>
               <a:rPr lang="fr-FR" dirty="0"/>
-              <a:t>PREVISION DES VENTES</a:t>
-            </a:r>
-          </a:p>
-        </p:txBody>
-      </p:sp>
+              <a:t>Ce sont les températures qui influent le plus sur les ventes.</a:t>
+            </a:r>
+          </a:p>
+        </p:txBody>
+      </p:sp>
+      <p:pic>
+        <p:nvPicPr>
+          <p:cNvPr id="10" name="Image 9">
+            <a:extLst>
+              <a:ext uri="{FF2B5EF4-FFF2-40B4-BE49-F238E27FC236}">
+                <a16:creationId xmlns:a16="http://schemas.microsoft.com/office/drawing/2014/main" id="{E30F18B5-AD7B-0488-54A0-DDFD896B0FC4}"/>
+              </a:ext>
+            </a:extLst>
+          </p:cNvPr>
+          <p:cNvPicPr>
+            <a:picLocks noChangeAspect="1"/>
+          </p:cNvPicPr>
+          <p:nvPr/>
+        </p:nvPicPr>
+        <p:blipFill>
+          <a:blip r:embed="rId5"/>
+          <a:stretch>
+            <a:fillRect/>
+          </a:stretch>
+        </p:blipFill>
+        <p:spPr>
+          <a:xfrm rot="1498134">
+            <a:off x="10475176" y="983285"/>
+            <a:ext cx="1626518" cy="1626518"/>
+          </a:xfrm>
+          <a:prstGeom prst="rect">
+            <a:avLst/>
+          </a:prstGeom>
+        </p:spPr>
+      </p:pic>
     </p:spTree>
     <p:extLst>
       <p:ext uri="{BB962C8B-B14F-4D97-AF65-F5344CB8AC3E}">
-        <p14:creationId xmlns:p14="http://schemas.microsoft.com/office/powerpoint/2010/main" val="3112204254"/>
+        <p14:creationId xmlns:p14="http://schemas.microsoft.com/office/powerpoint/2010/main" val="577301080"/>
       </p:ext>
     </p:extLst>
   </p:cSld>
@@ -3628,12 +4801,47 @@
           <a:chExt cx="0" cy="0"/>
         </a:xfrm>
       </p:grpSpPr>
+      <p:sp>
+        <p:nvSpPr>
+          <p:cNvPr id="2" name="ZoneTexte 1">
+            <a:extLst>
+              <a:ext uri="{FF2B5EF4-FFF2-40B4-BE49-F238E27FC236}">
+                <a16:creationId xmlns:a16="http://schemas.microsoft.com/office/drawing/2014/main" id="{873D8BC6-F4F5-1851-8CA2-C976FCB1308C}"/>
+              </a:ext>
+            </a:extLst>
+          </p:cNvPr>
+          <p:cNvSpPr txBox="1"/>
+          <p:nvPr/>
+        </p:nvSpPr>
+        <p:spPr>
+          <a:xfrm>
+            <a:off x="3915563" y="-5401"/>
+            <a:ext cx="4088363" cy="646331"/>
+          </a:xfrm>
+          <a:prstGeom prst="rect">
+            <a:avLst/>
+          </a:prstGeom>
+          <a:noFill/>
+        </p:spPr>
+        <p:txBody>
+          <a:bodyPr wrap="none" rtlCol="0">
+            <a:spAutoFit/>
+          </a:bodyPr>
+          <a:lstStyle/>
+          <a:p>
+            <a:r>
+              <a:rPr lang="fr-FR" sz="3600" dirty="0"/>
+              <a:t>Prévision des ventes</a:t>
+            </a:r>
+          </a:p>
+        </p:txBody>
+      </p:sp>
       <p:pic>
         <p:nvPicPr>
-          <p:cNvPr id="3" name="Image 2">
-            <a:extLst>
-              <a:ext uri="{FF2B5EF4-FFF2-40B4-BE49-F238E27FC236}">
-                <a16:creationId xmlns:a16="http://schemas.microsoft.com/office/drawing/2014/main" id="{2C992570-A6FF-AC37-EFAF-1EE7CA43969F}"/>
+          <p:cNvPr id="21" name="Image 20">
+            <a:extLst>
+              <a:ext uri="{FF2B5EF4-FFF2-40B4-BE49-F238E27FC236}">
+                <a16:creationId xmlns:a16="http://schemas.microsoft.com/office/drawing/2014/main" id="{C14E86CE-B903-89AD-4AFE-0081DF51AF02}"/>
               </a:ext>
             </a:extLst>
           </p:cNvPr>
@@ -3643,14 +4851,93 @@
           <p:nvPr/>
         </p:nvPicPr>
         <p:blipFill rotWithShape="1">
-          <a:blip r:embed="rId2"/>
-          <a:srcRect l="8850" t="11018" r="8478" b="10286"/>
+          <a:blip r:embed="rId2">
+            <a:extLst>
+              <a:ext uri="{BEBA8EAE-BF5A-486C-A8C5-ECC9F3942E4B}">
+                <a14:imgProps xmlns:a14="http://schemas.microsoft.com/office/drawing/2010/main">
+                  <a14:imgLayer r:embed="rId3">
+                    <a14:imgEffect>
+                      <a14:backgroundRemoval t="6054" b="96861" l="667" r="99500">
+                        <a14:foregroundMark x1="15500" y1="25336" x2="13167" y2="36099"/>
+                        <a14:foregroundMark x1="13167" y1="36099" x2="333" y2="45067"/>
+                        <a14:foregroundMark x1="333" y1="45067" x2="6000" y2="54933"/>
+                        <a14:foregroundMark x1="6000" y1="54933" x2="12833" y2="50224"/>
+                        <a14:foregroundMark x1="12833" y1="50224" x2="19000" y2="49103"/>
+                        <a14:foregroundMark x1="19000" y1="49103" x2="29333" y2="50897"/>
+                        <a14:foregroundMark x1="18667" y1="49327" x2="3333" y2="50897"/>
+                        <a14:foregroundMark x1="667" y1="50224" x2="3167" y2="55157"/>
+                        <a14:foregroundMark x1="4500" y1="52915" x2="4333" y2="56054"/>
+                        <a14:foregroundMark x1="24833" y1="26457" x2="28333" y2="17713"/>
+                        <a14:foregroundMark x1="28333" y1="17713" x2="25000" y2="10538"/>
+                        <a14:foregroundMark x1="25000" y1="10538" x2="32667" y2="6502"/>
+                        <a14:foregroundMark x1="32667" y1="6502" x2="33333" y2="8296"/>
+                        <a14:foregroundMark x1="33500" y1="7623" x2="40500" y2="15695"/>
+                        <a14:foregroundMark x1="40500" y1="15695" x2="40167" y2="16816"/>
+                        <a14:foregroundMark x1="36333" y1="19058" x2="37167" y2="30269"/>
+                        <a14:foregroundMark x1="37167" y1="30269" x2="39000" y2="32063"/>
+                        <a14:foregroundMark x1="34000" y1="28251" x2="30000" y2="33408"/>
+                        <a14:foregroundMark x1="30833" y1="68834" x2="28167" y2="71749"/>
+                        <a14:foregroundMark x1="26000" y1="82511" x2="11833" y2="86771"/>
+                        <a14:foregroundMark x1="11833" y1="86771" x2="16667" y2="93498"/>
+                        <a14:foregroundMark x1="16667" y1="93498" x2="23167" y2="92601"/>
+                        <a14:foregroundMark x1="23167" y1="92601" x2="45500" y2="97309"/>
+                        <a14:foregroundMark x1="45500" y1="97309" x2="48000" y2="88789"/>
+                        <a14:foregroundMark x1="48000" y1="88789" x2="42833" y2="79148"/>
+                        <a14:foregroundMark x1="42833" y1="79148" x2="20833" y2="83632"/>
+                        <a14:foregroundMark x1="54000" y1="74439" x2="74000" y2="60090"/>
+                        <a14:foregroundMark x1="75333" y1="47309" x2="76167" y2="60314"/>
+                        <a14:foregroundMark x1="76167" y1="60314" x2="81000" y2="75112"/>
+                        <a14:foregroundMark x1="49500" y1="24215" x2="66667" y2="29372"/>
+                        <a14:foregroundMark x1="57167" y1="18386" x2="63833" y2="23767"/>
+                        <a14:foregroundMark x1="63833" y1="23767" x2="66167" y2="24439"/>
+                        <a14:foregroundMark x1="66833" y1="14350" x2="69667" y2="25112"/>
+                        <a14:foregroundMark x1="69667" y1="25112" x2="73000" y2="31390"/>
+                        <a14:foregroundMark x1="79667" y1="17937" x2="72167" y2="41256"/>
+                        <a14:foregroundMark x1="72167" y1="41256" x2="72167" y2="41704"/>
+                        <a14:foregroundMark x1="83000" y1="24215" x2="83167" y2="36099"/>
+                        <a14:foregroundMark x1="83167" y1="36099" x2="88000" y2="44843"/>
+                        <a14:foregroundMark x1="88000" y1="44843" x2="88500" y2="45291"/>
+                        <a14:foregroundMark x1="62833" y1="10538" x2="74000" y2="7399"/>
+                        <a14:foregroundMark x1="80167" y1="9193" x2="86667" y2="12556"/>
+                        <a14:foregroundMark x1="86667" y1="12556" x2="95667" y2="13453"/>
+                        <a14:foregroundMark x1="94667" y1="7848" x2="90667" y2="22870"/>
+                        <a14:foregroundMark x1="94167" y1="10538" x2="97500" y2="9641"/>
+                        <a14:foregroundMark x1="63167" y1="8969" x2="53500" y2="16816"/>
+                        <a14:foregroundMark x1="54500" y1="9193" x2="49000" y2="15247"/>
+                        <a14:foregroundMark x1="49000" y1="15247" x2="47333" y2="18834"/>
+                        <a14:foregroundMark x1="55833" y1="8072" x2="49500" y2="11435"/>
+                        <a14:foregroundMark x1="49500" y1="11435" x2="48000" y2="13004"/>
+                        <a14:foregroundMark x1="57000" y1="7848" x2="49000" y2="11659"/>
+                        <a14:foregroundMark x1="53667" y1="7623" x2="47833" y2="10987"/>
+                        <a14:foregroundMark x1="47833" y1="10987" x2="44000" y2="16816"/>
+                        <a14:foregroundMark x1="81500" y1="54036" x2="82167" y2="64126"/>
+                        <a14:foregroundMark x1="82167" y1="64126" x2="80167" y2="72422"/>
+                        <a14:foregroundMark x1="80167" y1="72422" x2="80333" y2="91704"/>
+                        <a14:foregroundMark x1="80333" y1="91704" x2="57833" y2="77578"/>
+                        <a14:foregroundMark x1="57833" y1="77578" x2="51667" y2="80269"/>
+                        <a14:foregroundMark x1="51667" y1="80269" x2="52500" y2="79148"/>
+                        <a14:foregroundMark x1="94667" y1="38341" x2="97167" y2="39686"/>
+                        <a14:foregroundMark x1="93500" y1="39910" x2="98667" y2="39910"/>
+                        <a14:foregroundMark x1="95333" y1="45964" x2="99500" y2="45964"/>
+                        <a14:foregroundMark x1="93500" y1="50673" x2="98333" y2="51794"/>
+                        <a14:foregroundMark x1="93833" y1="56054" x2="98500" y2="55605"/>
+                        <a14:foregroundMark x1="92833" y1="58072" x2="88500" y2="60762"/>
+                        <a14:foregroundMark x1="87833" y1="60538" x2="94500" y2="59193"/>
+                        <a14:foregroundMark x1="94500" y1="59193" x2="96000" y2="56502"/>
+                      </a14:backgroundRemoval>
+                    </a14:imgEffect>
+                  </a14:imgLayer>
+                </a14:imgProps>
+              </a:ext>
+            </a:extLst>
+          </a:blip>
+          <a:srcRect l="1424" t="3266" r="1936" b="3692"/>
           <a:stretch/>
         </p:blipFill>
         <p:spPr>
           <a:xfrm>
-            <a:off x="150004" y="960736"/>
-            <a:ext cx="6425515" cy="3398109"/>
+            <a:off x="4542835" y="1278194"/>
+            <a:ext cx="7364030" cy="5270090"/>
           </a:xfrm>
           <a:prstGeom prst="rect">
             <a:avLst/>
@@ -3659,57 +4946,1408 @@
       </p:pic>
       <p:pic>
         <p:nvPicPr>
-          <p:cNvPr id="3074" name="Picture 2" descr="Illustration De Concept Abstrait De Prévision Des Ventes | Vecteur Gratuite">
-            <a:extLst>
-              <a:ext uri="{FF2B5EF4-FFF2-40B4-BE49-F238E27FC236}">
-                <a16:creationId xmlns:a16="http://schemas.microsoft.com/office/drawing/2014/main" id="{98482A24-D786-499D-ABF1-363119EB40CC}"/>
+          <p:cNvPr id="24" name="Image 23">
+            <a:extLst>
+              <a:ext uri="{FF2B5EF4-FFF2-40B4-BE49-F238E27FC236}">
+                <a16:creationId xmlns:a16="http://schemas.microsoft.com/office/drawing/2014/main" id="{F7C70B9E-3ADF-F0A2-EE28-28AB07115347}"/>
               </a:ext>
             </a:extLst>
           </p:cNvPr>
           <p:cNvPicPr>
-            <a:picLocks noChangeAspect="1" noChangeArrowheads="1"/>
+            <a:picLocks noChangeAspect="1"/>
           </p:cNvPicPr>
           <p:nvPr/>
         </p:nvPicPr>
-        <p:blipFill>
-          <a:blip r:embed="rId3">
-            <a:extLst>
-              <a:ext uri="{28A0092B-C50C-407E-A947-70E740481C1C}">
-                <a14:useLocalDpi xmlns:a14="http://schemas.microsoft.com/office/drawing/2010/main" val="0"/>
-              </a:ext>
-            </a:extLst>
-          </a:blip>
-          <a:srcRect/>
-          <a:stretch>
-            <a:fillRect/>
-          </a:stretch>
+        <p:blipFill rotWithShape="1">
+          <a:blip r:embed="rId4"/>
+          <a:srcRect l="11195" t="11100" r="9235" b="10797"/>
+          <a:stretch/>
         </p:blipFill>
-        <p:spPr bwMode="auto">
+        <p:spPr>
           <a:xfrm>
-            <a:off x="6853686" y="2378674"/>
-            <a:ext cx="4572000" cy="4572000"/>
+            <a:off x="285135" y="1278194"/>
+            <a:ext cx="4502842" cy="2455444"/>
+          </a:xfrm>
+          <a:prstGeom prst="rect">
+            <a:avLst/>
+          </a:prstGeom>
+        </p:spPr>
+      </p:pic>
+      <p:sp>
+        <p:nvSpPr>
+          <p:cNvPr id="25" name="ZoneTexte 24">
+            <a:extLst>
+              <a:ext uri="{FF2B5EF4-FFF2-40B4-BE49-F238E27FC236}">
+                <a16:creationId xmlns:a16="http://schemas.microsoft.com/office/drawing/2014/main" id="{151D26FD-36F8-C5F4-DF07-C3AADD7E291D}"/>
+              </a:ext>
+            </a:extLst>
+          </p:cNvPr>
+          <p:cNvSpPr txBox="1"/>
+          <p:nvPr/>
+        </p:nvSpPr>
+        <p:spPr>
+          <a:xfrm>
+            <a:off x="820827" y="4857124"/>
+            <a:ext cx="3431458" cy="830997"/>
           </a:xfrm>
           <a:prstGeom prst="rect">
             <a:avLst/>
           </a:prstGeom>
           <a:noFill/>
-          <a:extLst>
-            <a:ext uri="{909E8E84-426E-40DD-AFC4-6F175D3DCCD1}">
-              <a14:hiddenFill xmlns:a14="http://schemas.microsoft.com/office/drawing/2010/main">
+        </p:spPr>
+        <p:txBody>
+          <a:bodyPr wrap="square" rtlCol="0">
+            <a:spAutoFit/>
+          </a:bodyPr>
+          <a:lstStyle/>
+          <a:p>
+            <a:r>
+              <a:rPr lang="fr-FR" sz="2400" dirty="0">
                 <a:solidFill>
-                  <a:srgbClr val="FFFFFF"/>
+                  <a:schemeClr val="accent1"/>
                 </a:solidFill>
-              </a14:hiddenFill>
-            </a:ext>
-          </a:extLst>
+              </a:rPr>
+              <a:t>On retrouve la tendance saisonnière des produits!</a:t>
+            </a:r>
+          </a:p>
+        </p:txBody>
+      </p:sp>
+    </p:spTree>
+    <p:extLst>
+      <p:ext uri="{BB962C8B-B14F-4D97-AF65-F5344CB8AC3E}">
+        <p14:creationId xmlns:p14="http://schemas.microsoft.com/office/powerpoint/2010/main" val="1198788856"/>
+      </p:ext>
+    </p:extLst>
+  </p:cSld>
+  <p:clrMapOvr>
+    <a:masterClrMapping/>
+  </p:clrMapOvr>
+</p:sld>
+</file>
+
+<file path=ppt/slides/slide6.xml><?xml version="1.0" encoding="utf-8"?>
+<p:sld xmlns:a="http://schemas.openxmlformats.org/drawingml/2006/main" xmlns:r="http://schemas.openxmlformats.org/officeDocument/2006/relationships" xmlns:p="http://schemas.openxmlformats.org/presentationml/2006/main">
+  <p:cSld>
+    <p:spTree>
+      <p:nvGrpSpPr>
+        <p:cNvPr id="1" name=""/>
+        <p:cNvGrpSpPr/>
+        <p:nvPr/>
+      </p:nvGrpSpPr>
+      <p:grpSpPr>
+        <a:xfrm>
+          <a:off x="0" y="0"/>
+          <a:ext cx="0" cy="0"/>
+          <a:chOff x="0" y="0"/>
+          <a:chExt cx="0" cy="0"/>
+        </a:xfrm>
+      </p:grpSpPr>
+      <p:sp>
+        <p:nvSpPr>
+          <p:cNvPr id="2" name="ZoneTexte 1">
+            <a:extLst>
+              <a:ext uri="{FF2B5EF4-FFF2-40B4-BE49-F238E27FC236}">
+                <a16:creationId xmlns:a16="http://schemas.microsoft.com/office/drawing/2014/main" id="{873D8BC6-F4F5-1851-8CA2-C976FCB1308C}"/>
+              </a:ext>
+            </a:extLst>
+          </p:cNvPr>
+          <p:cNvSpPr txBox="1"/>
+          <p:nvPr/>
+        </p:nvSpPr>
+        <p:spPr>
+          <a:xfrm>
+            <a:off x="3995598" y="-2409"/>
+            <a:ext cx="4088363" cy="646331"/>
+          </a:xfrm>
+          <a:prstGeom prst="rect">
+            <a:avLst/>
+          </a:prstGeom>
+          <a:noFill/>
         </p:spPr>
-      </p:pic>
+        <p:txBody>
+          <a:bodyPr wrap="none" rtlCol="0">
+            <a:spAutoFit/>
+          </a:bodyPr>
+          <a:lstStyle/>
+          <a:p>
+            <a:r>
+              <a:rPr lang="fr-FR" sz="3600" dirty="0"/>
+              <a:t>Prévision des ventes</a:t>
+            </a:r>
+          </a:p>
+        </p:txBody>
+      </p:sp>
+      <p:sp>
+        <p:nvSpPr>
+          <p:cNvPr id="59" name="ZoneTexte 58">
+            <a:extLst>
+              <a:ext uri="{FF2B5EF4-FFF2-40B4-BE49-F238E27FC236}">
+                <a16:creationId xmlns:a16="http://schemas.microsoft.com/office/drawing/2014/main" id="{77212C0C-3894-12A8-462B-23DAB6336D7D}"/>
+              </a:ext>
+            </a:extLst>
+          </p:cNvPr>
+          <p:cNvSpPr txBox="1"/>
+          <p:nvPr/>
+        </p:nvSpPr>
+        <p:spPr>
+          <a:xfrm>
+            <a:off x="815031" y="1139120"/>
+            <a:ext cx="3839196" cy="707886"/>
+          </a:xfrm>
+          <a:prstGeom prst="rect">
+            <a:avLst/>
+          </a:prstGeom>
+          <a:noFill/>
+        </p:spPr>
+        <p:txBody>
+          <a:bodyPr wrap="square" rtlCol="0">
+            <a:spAutoFit/>
+          </a:bodyPr>
+          <a:lstStyle/>
+          <a:p>
+            <a:r>
+              <a:rPr lang="fr-FR" dirty="0"/>
+              <a:t>Le </a:t>
+            </a:r>
+            <a:r>
+              <a:rPr lang="fr-FR" sz="2000" b="1" dirty="0">
+                <a:solidFill>
+                  <a:srgbClr val="00B0F0"/>
+                </a:solidFill>
+              </a:rPr>
+              <a:t>produit A</a:t>
+            </a:r>
+            <a:r>
+              <a:rPr lang="fr-FR" dirty="0"/>
+              <a:t> s’est vendu en moyenne à </a:t>
+            </a:r>
+            <a:r>
+              <a:rPr lang="fr-FR" sz="2000" dirty="0">
+                <a:solidFill>
+                  <a:srgbClr val="00B0F0"/>
+                </a:solidFill>
+              </a:rPr>
+              <a:t>65 unités / jour </a:t>
+            </a:r>
+            <a:r>
+              <a:rPr lang="fr-FR" dirty="0"/>
+              <a:t>en juin 2019.</a:t>
+            </a:r>
+          </a:p>
+        </p:txBody>
+      </p:sp>
+      <p:sp>
+        <p:nvSpPr>
+          <p:cNvPr id="61" name="ZoneTexte 60">
+            <a:extLst>
+              <a:ext uri="{FF2B5EF4-FFF2-40B4-BE49-F238E27FC236}">
+                <a16:creationId xmlns:a16="http://schemas.microsoft.com/office/drawing/2014/main" id="{9F4B546B-1CFE-936B-92D8-602FBF32C72D}"/>
+              </a:ext>
+            </a:extLst>
+          </p:cNvPr>
+          <p:cNvSpPr txBox="1"/>
+          <p:nvPr/>
+        </p:nvSpPr>
+        <p:spPr>
+          <a:xfrm>
+            <a:off x="4335134" y="1674979"/>
+            <a:ext cx="5459831" cy="830997"/>
+          </a:xfrm>
+          <a:prstGeom prst="rect">
+            <a:avLst/>
+          </a:prstGeom>
+          <a:noFill/>
+        </p:spPr>
+        <p:txBody>
+          <a:bodyPr wrap="square" rtlCol="0">
+            <a:spAutoFit/>
+          </a:bodyPr>
+          <a:lstStyle/>
+          <a:p>
+            <a:r>
+              <a:rPr lang="fr-FR" dirty="0"/>
+              <a:t>Sur la même période, le </a:t>
+            </a:r>
+            <a:r>
+              <a:rPr lang="fr-FR" sz="2400" b="1" dirty="0">
+                <a:solidFill>
+                  <a:srgbClr val="FF69B4"/>
+                </a:solidFill>
+              </a:rPr>
+              <a:t>produit B </a:t>
+            </a:r>
+            <a:r>
+              <a:rPr lang="fr-FR" dirty="0"/>
+              <a:t>a connu une vente moyenne journalière de </a:t>
+            </a:r>
+            <a:r>
+              <a:rPr lang="fr-FR" sz="2400" dirty="0">
+                <a:solidFill>
+                  <a:srgbClr val="FF69B4"/>
+                </a:solidFill>
+              </a:rPr>
+              <a:t>165</a:t>
+            </a:r>
+            <a:r>
+              <a:rPr lang="fr-FR" dirty="0"/>
+              <a:t> exemplaires.</a:t>
+            </a:r>
+          </a:p>
+        </p:txBody>
+      </p:sp>
+      <p:grpSp>
+        <p:nvGrpSpPr>
+          <p:cNvPr id="3083" name="Groupe 3082">
+            <a:extLst>
+              <a:ext uri="{FF2B5EF4-FFF2-40B4-BE49-F238E27FC236}">
+                <a16:creationId xmlns:a16="http://schemas.microsoft.com/office/drawing/2014/main" id="{86241672-FAED-1439-EBF6-2CB6B5861D12}"/>
+              </a:ext>
+            </a:extLst>
+          </p:cNvPr>
+          <p:cNvGrpSpPr/>
+          <p:nvPr/>
+        </p:nvGrpSpPr>
+        <p:grpSpPr>
+          <a:xfrm>
+            <a:off x="470294" y="3293562"/>
+            <a:ext cx="8750095" cy="2541448"/>
+            <a:chOff x="1883196" y="965912"/>
+            <a:chExt cx="8750095" cy="2541448"/>
+          </a:xfrm>
+        </p:grpSpPr>
+        <p:sp>
+          <p:nvSpPr>
+            <p:cNvPr id="3082" name="Rectangle : coins arrondis 3081">
+              <a:extLst>
+                <a:ext uri="{FF2B5EF4-FFF2-40B4-BE49-F238E27FC236}">
+                  <a16:creationId xmlns:a16="http://schemas.microsoft.com/office/drawing/2014/main" id="{CCAB490A-606B-A6C6-7CF1-9D06F46B795D}"/>
+                </a:ext>
+              </a:extLst>
+            </p:cNvPr>
+            <p:cNvSpPr/>
+            <p:nvPr/>
+          </p:nvSpPr>
+          <p:spPr>
+            <a:xfrm>
+              <a:off x="1883196" y="965912"/>
+              <a:ext cx="8750095" cy="2541448"/>
+            </a:xfrm>
+            <a:prstGeom prst="roundRect">
+              <a:avLst/>
+            </a:prstGeom>
+            <a:gradFill>
+              <a:gsLst>
+                <a:gs pos="68000">
+                  <a:srgbClr val="94DDF9"/>
+                </a:gs>
+                <a:gs pos="100000">
+                  <a:srgbClr val="DDF5FF"/>
+                </a:gs>
+                <a:gs pos="0">
+                  <a:srgbClr val="00B0F0"/>
+                </a:gs>
+              </a:gsLst>
+              <a:lin ang="5400000" scaled="1"/>
+            </a:gradFill>
+          </p:spPr>
+          <p:style>
+            <a:lnRef idx="2">
+              <a:schemeClr val="accent1">
+                <a:shade val="50000"/>
+              </a:schemeClr>
+            </a:lnRef>
+            <a:fillRef idx="1">
+              <a:schemeClr val="accent1"/>
+            </a:fillRef>
+            <a:effectRef idx="0">
+              <a:schemeClr val="accent1"/>
+            </a:effectRef>
+            <a:fontRef idx="minor">
+              <a:schemeClr val="lt1"/>
+            </a:fontRef>
+          </p:style>
+          <p:txBody>
+            <a:bodyPr rtlCol="0" anchor="ctr"/>
+            <a:lstStyle/>
+            <a:p>
+              <a:pPr algn="ctr"/>
+              <a:endParaRPr lang="fr-FR"/>
+            </a:p>
+          </p:txBody>
+        </p:sp>
+        <p:sp>
+          <p:nvSpPr>
+            <p:cNvPr id="7" name="ZoneTexte 6">
+              <a:extLst>
+                <a:ext uri="{FF2B5EF4-FFF2-40B4-BE49-F238E27FC236}">
+                  <a16:creationId xmlns:a16="http://schemas.microsoft.com/office/drawing/2014/main" id="{087EFDDB-827D-91A3-A162-5EB677D48595}"/>
+                </a:ext>
+              </a:extLst>
+            </p:cNvPr>
+            <p:cNvSpPr txBox="1"/>
+            <p:nvPr/>
+          </p:nvSpPr>
+          <p:spPr>
+            <a:xfrm>
+              <a:off x="2207218" y="1219016"/>
+              <a:ext cx="1107996" cy="369332"/>
+            </a:xfrm>
+            <a:prstGeom prst="rect">
+              <a:avLst/>
+            </a:prstGeom>
+            <a:noFill/>
+          </p:spPr>
+          <p:txBody>
+            <a:bodyPr wrap="none" rtlCol="0">
+              <a:spAutoFit/>
+            </a:bodyPr>
+            <a:lstStyle/>
+            <a:p>
+              <a:r>
+                <a:rPr lang="fr-FR" dirty="0">
+                  <a:solidFill>
+                    <a:schemeClr val="bg1"/>
+                  </a:solidFill>
+                </a:rPr>
+                <a:t>21/06/21</a:t>
+              </a:r>
+            </a:p>
+          </p:txBody>
+        </p:sp>
+        <p:sp>
+          <p:nvSpPr>
+            <p:cNvPr id="8" name="ZoneTexte 7">
+              <a:extLst>
+                <a:ext uri="{FF2B5EF4-FFF2-40B4-BE49-F238E27FC236}">
+                  <a16:creationId xmlns:a16="http://schemas.microsoft.com/office/drawing/2014/main" id="{BD513ACE-B2DF-9778-7824-B1C5530CF56F}"/>
+                </a:ext>
+              </a:extLst>
+            </p:cNvPr>
+            <p:cNvSpPr txBox="1"/>
+            <p:nvPr/>
+          </p:nvSpPr>
+          <p:spPr>
+            <a:xfrm>
+              <a:off x="3415276" y="1219016"/>
+              <a:ext cx="1066318" cy="369332"/>
+            </a:xfrm>
+            <a:prstGeom prst="rect">
+              <a:avLst/>
+            </a:prstGeom>
+            <a:noFill/>
+          </p:spPr>
+          <p:txBody>
+            <a:bodyPr wrap="none" rtlCol="0">
+              <a:spAutoFit/>
+            </a:bodyPr>
+            <a:lstStyle/>
+            <a:p>
+              <a:r>
+                <a:rPr lang="fr-FR" dirty="0">
+                  <a:solidFill>
+                    <a:schemeClr val="bg1"/>
+                  </a:solidFill>
+                </a:rPr>
+                <a:t>22/06/21</a:t>
+              </a:r>
+            </a:p>
+          </p:txBody>
+        </p:sp>
+        <p:sp>
+          <p:nvSpPr>
+            <p:cNvPr id="9" name="ZoneTexte 8">
+              <a:extLst>
+                <a:ext uri="{FF2B5EF4-FFF2-40B4-BE49-F238E27FC236}">
+                  <a16:creationId xmlns:a16="http://schemas.microsoft.com/office/drawing/2014/main" id="{223AE3B3-123A-F6D5-8B87-5BEE31D289C6}"/>
+                </a:ext>
+              </a:extLst>
+            </p:cNvPr>
+            <p:cNvSpPr txBox="1"/>
+            <p:nvPr/>
+          </p:nvSpPr>
+          <p:spPr>
+            <a:xfrm>
+              <a:off x="4581656" y="1223379"/>
+              <a:ext cx="1066318" cy="369332"/>
+            </a:xfrm>
+            <a:prstGeom prst="rect">
+              <a:avLst/>
+            </a:prstGeom>
+            <a:noFill/>
+          </p:spPr>
+          <p:txBody>
+            <a:bodyPr wrap="none" rtlCol="0">
+              <a:spAutoFit/>
+            </a:bodyPr>
+            <a:lstStyle/>
+            <a:p>
+              <a:r>
+                <a:rPr lang="fr-FR" dirty="0">
+                  <a:solidFill>
+                    <a:schemeClr val="bg1"/>
+                  </a:solidFill>
+                </a:rPr>
+                <a:t>23/06/21</a:t>
+              </a:r>
+            </a:p>
+          </p:txBody>
+        </p:sp>
+        <p:sp>
+          <p:nvSpPr>
+            <p:cNvPr id="11" name="ZoneTexte 10">
+              <a:extLst>
+                <a:ext uri="{FF2B5EF4-FFF2-40B4-BE49-F238E27FC236}">
+                  <a16:creationId xmlns:a16="http://schemas.microsoft.com/office/drawing/2014/main" id="{E09230D3-E50E-52A2-9033-D2FFE1AB6D96}"/>
+                </a:ext>
+              </a:extLst>
+            </p:cNvPr>
+            <p:cNvSpPr txBox="1"/>
+            <p:nvPr/>
+          </p:nvSpPr>
+          <p:spPr>
+            <a:xfrm>
+              <a:off x="5748036" y="1230483"/>
+              <a:ext cx="1066318" cy="369332"/>
+            </a:xfrm>
+            <a:prstGeom prst="rect">
+              <a:avLst/>
+            </a:prstGeom>
+            <a:noFill/>
+          </p:spPr>
+          <p:txBody>
+            <a:bodyPr wrap="none" rtlCol="0">
+              <a:spAutoFit/>
+            </a:bodyPr>
+            <a:lstStyle/>
+            <a:p>
+              <a:r>
+                <a:rPr lang="fr-FR" dirty="0">
+                  <a:solidFill>
+                    <a:schemeClr val="bg1"/>
+                  </a:solidFill>
+                </a:rPr>
+                <a:t>24/06/21</a:t>
+              </a:r>
+            </a:p>
+          </p:txBody>
+        </p:sp>
+        <p:sp>
+          <p:nvSpPr>
+            <p:cNvPr id="12" name="ZoneTexte 11">
+              <a:extLst>
+                <a:ext uri="{FF2B5EF4-FFF2-40B4-BE49-F238E27FC236}">
+                  <a16:creationId xmlns:a16="http://schemas.microsoft.com/office/drawing/2014/main" id="{4815FC4E-7E23-2669-5372-A06001D0F613}"/>
+                </a:ext>
+              </a:extLst>
+            </p:cNvPr>
+            <p:cNvSpPr txBox="1"/>
+            <p:nvPr/>
+          </p:nvSpPr>
+          <p:spPr>
+            <a:xfrm>
+              <a:off x="6914262" y="1230483"/>
+              <a:ext cx="1066318" cy="369332"/>
+            </a:xfrm>
+            <a:prstGeom prst="rect">
+              <a:avLst/>
+            </a:prstGeom>
+            <a:noFill/>
+          </p:spPr>
+          <p:txBody>
+            <a:bodyPr wrap="none" rtlCol="0">
+              <a:spAutoFit/>
+            </a:bodyPr>
+            <a:lstStyle/>
+            <a:p>
+              <a:r>
+                <a:rPr lang="fr-FR" dirty="0">
+                  <a:solidFill>
+                    <a:schemeClr val="bg1"/>
+                  </a:solidFill>
+                </a:rPr>
+                <a:t>25/06/21</a:t>
+              </a:r>
+            </a:p>
+          </p:txBody>
+        </p:sp>
+        <p:sp>
+          <p:nvSpPr>
+            <p:cNvPr id="13" name="ZoneTexte 12">
+              <a:extLst>
+                <a:ext uri="{FF2B5EF4-FFF2-40B4-BE49-F238E27FC236}">
+                  <a16:creationId xmlns:a16="http://schemas.microsoft.com/office/drawing/2014/main" id="{10817439-00CA-C4A3-15A4-0B9A5A28C172}"/>
+                </a:ext>
+              </a:extLst>
+            </p:cNvPr>
+            <p:cNvSpPr txBox="1"/>
+            <p:nvPr/>
+          </p:nvSpPr>
+          <p:spPr>
+            <a:xfrm>
+              <a:off x="8080488" y="1219016"/>
+              <a:ext cx="1066318" cy="369332"/>
+            </a:xfrm>
+            <a:prstGeom prst="rect">
+              <a:avLst/>
+            </a:prstGeom>
+            <a:noFill/>
+          </p:spPr>
+          <p:txBody>
+            <a:bodyPr wrap="none" rtlCol="0">
+              <a:spAutoFit/>
+            </a:bodyPr>
+            <a:lstStyle/>
+            <a:p>
+              <a:r>
+                <a:rPr lang="fr-FR" dirty="0">
+                  <a:solidFill>
+                    <a:schemeClr val="bg1"/>
+                  </a:solidFill>
+                </a:rPr>
+                <a:t>26/06/21</a:t>
+              </a:r>
+            </a:p>
+          </p:txBody>
+        </p:sp>
+        <p:sp>
+          <p:nvSpPr>
+            <p:cNvPr id="14" name="ZoneTexte 13">
+              <a:extLst>
+                <a:ext uri="{FF2B5EF4-FFF2-40B4-BE49-F238E27FC236}">
+                  <a16:creationId xmlns:a16="http://schemas.microsoft.com/office/drawing/2014/main" id="{B9DB641B-EE82-4423-AB65-6F7B16A2F870}"/>
+                </a:ext>
+              </a:extLst>
+            </p:cNvPr>
+            <p:cNvSpPr txBox="1"/>
+            <p:nvPr/>
+          </p:nvSpPr>
+          <p:spPr>
+            <a:xfrm>
+              <a:off x="9276979" y="1219016"/>
+              <a:ext cx="1066318" cy="369332"/>
+            </a:xfrm>
+            <a:prstGeom prst="rect">
+              <a:avLst/>
+            </a:prstGeom>
+            <a:noFill/>
+          </p:spPr>
+          <p:txBody>
+            <a:bodyPr wrap="none" rtlCol="0">
+              <a:spAutoFit/>
+            </a:bodyPr>
+            <a:lstStyle/>
+            <a:p>
+              <a:r>
+                <a:rPr lang="fr-FR" dirty="0">
+                  <a:solidFill>
+                    <a:schemeClr val="bg1"/>
+                  </a:solidFill>
+                </a:rPr>
+                <a:t>27/06/21</a:t>
+              </a:r>
+            </a:p>
+          </p:txBody>
+        </p:sp>
+        <p:sp>
+          <p:nvSpPr>
+            <p:cNvPr id="4" name="ZoneTexte 3">
+              <a:extLst>
+                <a:ext uri="{FF2B5EF4-FFF2-40B4-BE49-F238E27FC236}">
+                  <a16:creationId xmlns:a16="http://schemas.microsoft.com/office/drawing/2014/main" id="{E4B5CEBC-E404-7083-EBB7-96CAF5F85DF6}"/>
+                </a:ext>
+              </a:extLst>
+            </p:cNvPr>
+            <p:cNvSpPr txBox="1"/>
+            <p:nvPr/>
+          </p:nvSpPr>
+          <p:spPr>
+            <a:xfrm>
+              <a:off x="1893290" y="1588348"/>
+              <a:ext cx="317716" cy="1200329"/>
+            </a:xfrm>
+            <a:prstGeom prst="rect">
+              <a:avLst/>
+            </a:prstGeom>
+            <a:noFill/>
+          </p:spPr>
+          <p:txBody>
+            <a:bodyPr wrap="none" rtlCol="0">
+              <a:spAutoFit/>
+            </a:bodyPr>
+            <a:lstStyle/>
+            <a:p>
+              <a:r>
+                <a:rPr lang="fr-FR" dirty="0">
+                  <a:solidFill>
+                    <a:schemeClr val="bg1"/>
+                  </a:solidFill>
+                </a:rPr>
+                <a:t>A</a:t>
+              </a:r>
+            </a:p>
+            <a:p>
+              <a:endParaRPr lang="fr-FR" dirty="0">
+                <a:solidFill>
+                  <a:schemeClr val="bg1"/>
+                </a:solidFill>
+              </a:endParaRPr>
+            </a:p>
+            <a:p>
+              <a:endParaRPr lang="fr-FR" dirty="0">
+                <a:solidFill>
+                  <a:schemeClr val="bg1"/>
+                </a:solidFill>
+              </a:endParaRPr>
+            </a:p>
+            <a:p>
+              <a:r>
+                <a:rPr lang="fr-FR" dirty="0">
+                  <a:solidFill>
+                    <a:schemeClr val="bg1"/>
+                  </a:solidFill>
+                </a:rPr>
+                <a:t>B</a:t>
+              </a:r>
+            </a:p>
+          </p:txBody>
+        </p:sp>
+        <p:pic>
+          <p:nvPicPr>
+            <p:cNvPr id="36" name="Image 35">
+              <a:extLst>
+                <a:ext uri="{FF2B5EF4-FFF2-40B4-BE49-F238E27FC236}">
+                  <a16:creationId xmlns:a16="http://schemas.microsoft.com/office/drawing/2014/main" id="{A730DF85-10A5-1B4A-17F2-D313C558F489}"/>
+                </a:ext>
+              </a:extLst>
+            </p:cNvPr>
+            <p:cNvPicPr>
+              <a:picLocks noChangeAspect="1"/>
+            </p:cNvPicPr>
+            <p:nvPr/>
+          </p:nvPicPr>
+          <p:blipFill rotWithShape="1">
+            <a:blip r:embed="rId2"/>
+            <a:srcRect l="3350" t="35927" r="83172" b="52358"/>
+            <a:stretch/>
+          </p:blipFill>
+          <p:spPr>
+            <a:xfrm>
+              <a:off x="2558097" y="1613179"/>
+              <a:ext cx="418799" cy="436833"/>
+            </a:xfrm>
+            <a:prstGeom prst="rect">
+              <a:avLst/>
+            </a:prstGeom>
+          </p:spPr>
+        </p:pic>
+        <p:pic>
+          <p:nvPicPr>
+            <p:cNvPr id="39" name="Image 38">
+              <a:extLst>
+                <a:ext uri="{FF2B5EF4-FFF2-40B4-BE49-F238E27FC236}">
+                  <a16:creationId xmlns:a16="http://schemas.microsoft.com/office/drawing/2014/main" id="{91535FDC-1459-3D29-C5F7-16A1971264D0}"/>
+                </a:ext>
+              </a:extLst>
+            </p:cNvPr>
+            <p:cNvPicPr>
+              <a:picLocks noChangeAspect="1"/>
+            </p:cNvPicPr>
+            <p:nvPr/>
+          </p:nvPicPr>
+          <p:blipFill rotWithShape="1">
+            <a:blip r:embed="rId2"/>
+            <a:srcRect l="40905" t="68268" r="40412" b="17906"/>
+            <a:stretch/>
+          </p:blipFill>
+          <p:spPr>
+            <a:xfrm>
+              <a:off x="8330297" y="2359427"/>
+              <a:ext cx="580541" cy="515506"/>
+            </a:xfrm>
+            <a:prstGeom prst="rect">
+              <a:avLst/>
+            </a:prstGeom>
+          </p:spPr>
+        </p:pic>
+        <p:pic>
+          <p:nvPicPr>
+            <p:cNvPr id="41" name="Image 40">
+              <a:extLst>
+                <a:ext uri="{FF2B5EF4-FFF2-40B4-BE49-F238E27FC236}">
+                  <a16:creationId xmlns:a16="http://schemas.microsoft.com/office/drawing/2014/main" id="{3DE5122A-D52A-F5B2-39DF-21E7B847C757}"/>
+                </a:ext>
+              </a:extLst>
+            </p:cNvPr>
+            <p:cNvPicPr>
+              <a:picLocks noChangeAspect="1"/>
+            </p:cNvPicPr>
+            <p:nvPr/>
+          </p:nvPicPr>
+          <p:blipFill rotWithShape="1">
+            <a:blip r:embed="rId2"/>
+            <a:srcRect l="20521" t="66291" r="60159" b="18191"/>
+            <a:stretch/>
+          </p:blipFill>
+          <p:spPr>
+            <a:xfrm>
+              <a:off x="5981180" y="1572806"/>
+              <a:ext cx="600302" cy="578619"/>
+            </a:xfrm>
+            <a:prstGeom prst="rect">
+              <a:avLst/>
+            </a:prstGeom>
+          </p:spPr>
+        </p:pic>
+        <p:pic>
+          <p:nvPicPr>
+            <p:cNvPr id="42" name="Image 41">
+              <a:extLst>
+                <a:ext uri="{FF2B5EF4-FFF2-40B4-BE49-F238E27FC236}">
+                  <a16:creationId xmlns:a16="http://schemas.microsoft.com/office/drawing/2014/main" id="{089C76E5-67D1-AD8F-00CD-63BF38ED63D3}"/>
+                </a:ext>
+              </a:extLst>
+            </p:cNvPr>
+            <p:cNvPicPr>
+              <a:picLocks noChangeAspect="1"/>
+            </p:cNvPicPr>
+            <p:nvPr/>
+          </p:nvPicPr>
+          <p:blipFill rotWithShape="1">
+            <a:blip r:embed="rId2"/>
+            <a:srcRect l="3350" t="35927" r="83172" b="52358"/>
+            <a:stretch/>
+          </p:blipFill>
+          <p:spPr>
+            <a:xfrm>
+              <a:off x="3707746" y="2377632"/>
+              <a:ext cx="418799" cy="436833"/>
+            </a:xfrm>
+            <a:prstGeom prst="rect">
+              <a:avLst/>
+            </a:prstGeom>
+          </p:spPr>
+        </p:pic>
+        <p:pic>
+          <p:nvPicPr>
+            <p:cNvPr id="43" name="Image 42">
+              <a:extLst>
+                <a:ext uri="{FF2B5EF4-FFF2-40B4-BE49-F238E27FC236}">
+                  <a16:creationId xmlns:a16="http://schemas.microsoft.com/office/drawing/2014/main" id="{378D4AC5-13A1-FA11-F5B9-F7B5C6036F6D}"/>
+                </a:ext>
+              </a:extLst>
+            </p:cNvPr>
+            <p:cNvPicPr>
+              <a:picLocks noChangeAspect="1"/>
+            </p:cNvPicPr>
+            <p:nvPr/>
+          </p:nvPicPr>
+          <p:blipFill rotWithShape="1">
+            <a:blip r:embed="rId2"/>
+            <a:srcRect l="3350" t="35927" r="83172" b="52358"/>
+            <a:stretch/>
+          </p:blipFill>
+          <p:spPr>
+            <a:xfrm>
+              <a:off x="4921027" y="2381048"/>
+              <a:ext cx="418799" cy="436833"/>
+            </a:xfrm>
+            <a:prstGeom prst="rect">
+              <a:avLst/>
+            </a:prstGeom>
+          </p:spPr>
+        </p:pic>
+        <p:pic>
+          <p:nvPicPr>
+            <p:cNvPr id="44" name="Image 43">
+              <a:extLst>
+                <a:ext uri="{FF2B5EF4-FFF2-40B4-BE49-F238E27FC236}">
+                  <a16:creationId xmlns:a16="http://schemas.microsoft.com/office/drawing/2014/main" id="{5D4ACA01-4EA5-423D-63E1-BD563496C80A}"/>
+                </a:ext>
+              </a:extLst>
+            </p:cNvPr>
+            <p:cNvPicPr>
+              <a:picLocks noChangeAspect="1"/>
+            </p:cNvPicPr>
+            <p:nvPr/>
+          </p:nvPicPr>
+          <p:blipFill rotWithShape="1">
+            <a:blip r:embed="rId2"/>
+            <a:srcRect l="3350" t="35927" r="83172" b="52358"/>
+            <a:stretch/>
+          </p:blipFill>
+          <p:spPr>
+            <a:xfrm>
+              <a:off x="6071795" y="2377633"/>
+              <a:ext cx="418799" cy="436833"/>
+            </a:xfrm>
+            <a:prstGeom prst="rect">
+              <a:avLst/>
+            </a:prstGeom>
+          </p:spPr>
+        </p:pic>
+        <p:pic>
+          <p:nvPicPr>
+            <p:cNvPr id="45" name="Image 44">
+              <a:extLst>
+                <a:ext uri="{FF2B5EF4-FFF2-40B4-BE49-F238E27FC236}">
+                  <a16:creationId xmlns:a16="http://schemas.microsoft.com/office/drawing/2014/main" id="{CAD23FAE-99D3-0A30-9BB9-43BF830CCE0E}"/>
+                </a:ext>
+              </a:extLst>
+            </p:cNvPr>
+            <p:cNvPicPr>
+              <a:picLocks noChangeAspect="1"/>
+            </p:cNvPicPr>
+            <p:nvPr/>
+          </p:nvPicPr>
+          <p:blipFill rotWithShape="1">
+            <a:blip r:embed="rId2"/>
+            <a:srcRect l="3350" t="35927" r="83172" b="52358"/>
+            <a:stretch/>
+          </p:blipFill>
+          <p:spPr>
+            <a:xfrm>
+              <a:off x="8404247" y="1628239"/>
+              <a:ext cx="418799" cy="436833"/>
+            </a:xfrm>
+            <a:prstGeom prst="rect">
+              <a:avLst/>
+            </a:prstGeom>
+          </p:spPr>
+        </p:pic>
+        <p:pic>
+          <p:nvPicPr>
+            <p:cNvPr id="46" name="Image 45">
+              <a:extLst>
+                <a:ext uri="{FF2B5EF4-FFF2-40B4-BE49-F238E27FC236}">
+                  <a16:creationId xmlns:a16="http://schemas.microsoft.com/office/drawing/2014/main" id="{AC22E8EE-5682-3DF8-83FF-9965ED97076D}"/>
+                </a:ext>
+              </a:extLst>
+            </p:cNvPr>
+            <p:cNvPicPr>
+              <a:picLocks noChangeAspect="1"/>
+            </p:cNvPicPr>
+            <p:nvPr/>
+          </p:nvPicPr>
+          <p:blipFill rotWithShape="1">
+            <a:blip r:embed="rId2"/>
+            <a:srcRect l="3350" t="35927" r="83172" b="52358"/>
+            <a:stretch/>
+          </p:blipFill>
+          <p:spPr>
+            <a:xfrm>
+              <a:off x="9600738" y="1613179"/>
+              <a:ext cx="418799" cy="436833"/>
+            </a:xfrm>
+            <a:prstGeom prst="rect">
+              <a:avLst/>
+            </a:prstGeom>
+          </p:spPr>
+        </p:pic>
+        <p:pic>
+          <p:nvPicPr>
+            <p:cNvPr id="47" name="Image 46">
+              <a:extLst>
+                <a:ext uri="{FF2B5EF4-FFF2-40B4-BE49-F238E27FC236}">
+                  <a16:creationId xmlns:a16="http://schemas.microsoft.com/office/drawing/2014/main" id="{B1A2BF0D-0CA2-CACF-0970-10ABB2FD2B88}"/>
+                </a:ext>
+              </a:extLst>
+            </p:cNvPr>
+            <p:cNvPicPr>
+              <a:picLocks noChangeAspect="1"/>
+            </p:cNvPicPr>
+            <p:nvPr/>
+          </p:nvPicPr>
+          <p:blipFill rotWithShape="1">
+            <a:blip r:embed="rId2"/>
+            <a:srcRect l="78997" t="34391" r="2345" b="51784"/>
+            <a:stretch/>
+          </p:blipFill>
+          <p:spPr>
+            <a:xfrm>
+              <a:off x="7164376" y="2329108"/>
+              <a:ext cx="579777" cy="515505"/>
+            </a:xfrm>
+            <a:prstGeom prst="rect">
+              <a:avLst/>
+            </a:prstGeom>
+          </p:spPr>
+        </p:pic>
+        <p:pic>
+          <p:nvPicPr>
+            <p:cNvPr id="51" name="Image 50">
+              <a:extLst>
+                <a:ext uri="{FF2B5EF4-FFF2-40B4-BE49-F238E27FC236}">
+                  <a16:creationId xmlns:a16="http://schemas.microsoft.com/office/drawing/2014/main" id="{DE91500E-38AA-64D5-ECBA-D795EE34D99D}"/>
+                </a:ext>
+              </a:extLst>
+            </p:cNvPr>
+            <p:cNvPicPr>
+              <a:picLocks noChangeAspect="1"/>
+            </p:cNvPicPr>
+            <p:nvPr/>
+          </p:nvPicPr>
+          <p:blipFill rotWithShape="1">
+            <a:blip r:embed="rId2"/>
+            <a:srcRect t="52205" r="80681" b="34947"/>
+            <a:stretch/>
+          </p:blipFill>
+          <p:spPr>
+            <a:xfrm>
+              <a:off x="3619510" y="1630893"/>
+              <a:ext cx="600302" cy="479097"/>
+            </a:xfrm>
+            <a:prstGeom prst="rect">
+              <a:avLst/>
+            </a:prstGeom>
+          </p:spPr>
+        </p:pic>
+        <p:pic>
+          <p:nvPicPr>
+            <p:cNvPr id="54" name="Image 53">
+              <a:extLst>
+                <a:ext uri="{FF2B5EF4-FFF2-40B4-BE49-F238E27FC236}">
+                  <a16:creationId xmlns:a16="http://schemas.microsoft.com/office/drawing/2014/main" id="{D982C3B1-F1ED-F800-4B8F-E2F0A439766F}"/>
+                </a:ext>
+              </a:extLst>
+            </p:cNvPr>
+            <p:cNvPicPr>
+              <a:picLocks noChangeAspect="1"/>
+            </p:cNvPicPr>
+            <p:nvPr/>
+          </p:nvPicPr>
+          <p:blipFill rotWithShape="1">
+            <a:blip r:embed="rId2"/>
+            <a:srcRect t="52205" r="80681" b="34947"/>
+            <a:stretch/>
+          </p:blipFill>
+          <p:spPr>
+            <a:xfrm>
+              <a:off x="4865075" y="1634281"/>
+              <a:ext cx="600302" cy="479097"/>
+            </a:xfrm>
+            <a:prstGeom prst="rect">
+              <a:avLst/>
+            </a:prstGeom>
+          </p:spPr>
+        </p:pic>
+        <p:pic>
+          <p:nvPicPr>
+            <p:cNvPr id="55" name="Image 54">
+              <a:extLst>
+                <a:ext uri="{FF2B5EF4-FFF2-40B4-BE49-F238E27FC236}">
+                  <a16:creationId xmlns:a16="http://schemas.microsoft.com/office/drawing/2014/main" id="{6FA9D15D-E7A6-8E47-98A0-FED4A38B37F1}"/>
+                </a:ext>
+              </a:extLst>
+            </p:cNvPr>
+            <p:cNvPicPr>
+              <a:picLocks noChangeAspect="1"/>
+            </p:cNvPicPr>
+            <p:nvPr/>
+          </p:nvPicPr>
+          <p:blipFill rotWithShape="1">
+            <a:blip r:embed="rId2"/>
+            <a:srcRect t="52205" r="80681" b="34947"/>
+            <a:stretch/>
+          </p:blipFill>
+          <p:spPr>
+            <a:xfrm>
+              <a:off x="2460338" y="2395836"/>
+              <a:ext cx="600302" cy="479097"/>
+            </a:xfrm>
+            <a:prstGeom prst="rect">
+              <a:avLst/>
+            </a:prstGeom>
+          </p:spPr>
+        </p:pic>
+        <p:pic>
+          <p:nvPicPr>
+            <p:cNvPr id="56" name="Image 55">
+              <a:extLst>
+                <a:ext uri="{FF2B5EF4-FFF2-40B4-BE49-F238E27FC236}">
+                  <a16:creationId xmlns:a16="http://schemas.microsoft.com/office/drawing/2014/main" id="{068979AF-D07E-D8DC-FE4A-390F0552EC99}"/>
+                </a:ext>
+              </a:extLst>
+            </p:cNvPr>
+            <p:cNvPicPr>
+              <a:picLocks noChangeAspect="1"/>
+            </p:cNvPicPr>
+            <p:nvPr/>
+          </p:nvPicPr>
+          <p:blipFill rotWithShape="1">
+            <a:blip r:embed="rId2"/>
+            <a:srcRect t="52205" r="80681" b="34947"/>
+            <a:stretch/>
+          </p:blipFill>
+          <p:spPr>
+            <a:xfrm>
+              <a:off x="7150817" y="1630892"/>
+              <a:ext cx="600302" cy="479097"/>
+            </a:xfrm>
+            <a:prstGeom prst="rect">
+              <a:avLst/>
+            </a:prstGeom>
+          </p:spPr>
+        </p:pic>
+        <p:pic>
+          <p:nvPicPr>
+            <p:cNvPr id="58" name="Image 57">
+              <a:extLst>
+                <a:ext uri="{FF2B5EF4-FFF2-40B4-BE49-F238E27FC236}">
+                  <a16:creationId xmlns:a16="http://schemas.microsoft.com/office/drawing/2014/main" id="{8D2CDAA2-4CD1-39DF-9823-0D405F5411B0}"/>
+                </a:ext>
+              </a:extLst>
+            </p:cNvPr>
+            <p:cNvPicPr>
+              <a:picLocks noChangeAspect="1"/>
+            </p:cNvPicPr>
+            <p:nvPr/>
+          </p:nvPicPr>
+          <p:blipFill rotWithShape="1">
+            <a:blip r:embed="rId2"/>
+            <a:srcRect t="52205" r="80681" b="34947"/>
+            <a:stretch/>
+          </p:blipFill>
+          <p:spPr>
+            <a:xfrm>
+              <a:off x="9509986" y="2365516"/>
+              <a:ext cx="600302" cy="479097"/>
+            </a:xfrm>
+            <a:prstGeom prst="rect">
+              <a:avLst/>
+            </a:prstGeom>
+          </p:spPr>
+        </p:pic>
+        <p:sp>
+          <p:nvSpPr>
+            <p:cNvPr id="60" name="ZoneTexte 59">
+              <a:extLst>
+                <a:ext uri="{FF2B5EF4-FFF2-40B4-BE49-F238E27FC236}">
+                  <a16:creationId xmlns:a16="http://schemas.microsoft.com/office/drawing/2014/main" id="{81281E79-13E6-6440-4DAF-FB2F8CCCB22C}"/>
+                </a:ext>
+              </a:extLst>
+            </p:cNvPr>
+            <p:cNvSpPr txBox="1"/>
+            <p:nvPr/>
+          </p:nvSpPr>
+          <p:spPr>
+            <a:xfrm>
+              <a:off x="1883997" y="1880427"/>
+              <a:ext cx="957822" cy="600164"/>
+            </a:xfrm>
+            <a:prstGeom prst="rect">
+              <a:avLst/>
+            </a:prstGeom>
+            <a:noFill/>
+          </p:spPr>
+          <p:txBody>
+            <a:bodyPr wrap="square" rtlCol="0">
+              <a:spAutoFit/>
+            </a:bodyPr>
+            <a:lstStyle/>
+            <a:p>
+              <a:r>
+                <a:rPr lang="fr-FR" sz="1100" dirty="0">
+                  <a:solidFill>
+                    <a:schemeClr val="bg1"/>
+                  </a:solidFill>
+                </a:rPr>
+                <a:t>Indice de confiance 3.5/5 </a:t>
+              </a:r>
+            </a:p>
+          </p:txBody>
+        </p:sp>
+        <p:sp>
+          <p:nvSpPr>
+            <p:cNvPr id="3072" name="ZoneTexte 3071">
+              <a:extLst>
+                <a:ext uri="{FF2B5EF4-FFF2-40B4-BE49-F238E27FC236}">
+                  <a16:creationId xmlns:a16="http://schemas.microsoft.com/office/drawing/2014/main" id="{798BC4D1-B9F6-132D-28BA-E571D8CF967A}"/>
+                </a:ext>
+              </a:extLst>
+            </p:cNvPr>
+            <p:cNvSpPr txBox="1"/>
+            <p:nvPr/>
+          </p:nvSpPr>
+          <p:spPr>
+            <a:xfrm>
+              <a:off x="1883196" y="2693893"/>
+              <a:ext cx="957822" cy="600164"/>
+            </a:xfrm>
+            <a:prstGeom prst="rect">
+              <a:avLst/>
+            </a:prstGeom>
+            <a:noFill/>
+          </p:spPr>
+          <p:txBody>
+            <a:bodyPr wrap="square" rtlCol="0">
+              <a:spAutoFit/>
+            </a:bodyPr>
+            <a:lstStyle/>
+            <a:p>
+              <a:r>
+                <a:rPr lang="fr-FR" sz="1100" dirty="0">
+                  <a:solidFill>
+                    <a:schemeClr val="bg1"/>
+                  </a:solidFill>
+                </a:rPr>
+                <a:t>Indice de confiance 4/5 </a:t>
+              </a:r>
+            </a:p>
+          </p:txBody>
+        </p:sp>
+        <p:cxnSp>
+          <p:nvCxnSpPr>
+            <p:cNvPr id="3076" name="Connecteur droit 3075">
+              <a:extLst>
+                <a:ext uri="{FF2B5EF4-FFF2-40B4-BE49-F238E27FC236}">
+                  <a16:creationId xmlns:a16="http://schemas.microsoft.com/office/drawing/2014/main" id="{1066DBC1-9CB7-0B58-B675-749A1DB242DA}"/>
+                </a:ext>
+              </a:extLst>
+            </p:cNvPr>
+            <p:cNvCxnSpPr/>
+            <p:nvPr/>
+          </p:nvCxnSpPr>
+          <p:spPr>
+            <a:xfrm>
+              <a:off x="3315214" y="1663333"/>
+              <a:ext cx="0" cy="1465006"/>
+            </a:xfrm>
+            <a:prstGeom prst="line">
+              <a:avLst/>
+            </a:prstGeom>
+            <a:ln w="12700">
+              <a:solidFill>
+                <a:schemeClr val="bg1"/>
+              </a:solidFill>
+            </a:ln>
+          </p:spPr>
+          <p:style>
+            <a:lnRef idx="1">
+              <a:schemeClr val="accent1"/>
+            </a:lnRef>
+            <a:fillRef idx="0">
+              <a:schemeClr val="accent1"/>
+            </a:fillRef>
+            <a:effectRef idx="0">
+              <a:schemeClr val="accent1"/>
+            </a:effectRef>
+            <a:fontRef idx="minor">
+              <a:schemeClr val="tx1"/>
+            </a:fontRef>
+          </p:style>
+        </p:cxnSp>
+        <p:cxnSp>
+          <p:nvCxnSpPr>
+            <p:cNvPr id="3077" name="Connecteur droit 3076">
+              <a:extLst>
+                <a:ext uri="{FF2B5EF4-FFF2-40B4-BE49-F238E27FC236}">
+                  <a16:creationId xmlns:a16="http://schemas.microsoft.com/office/drawing/2014/main" id="{DA2B0586-DEF9-E7A6-FD1B-411319B9D4BE}"/>
+                </a:ext>
+              </a:extLst>
+            </p:cNvPr>
+            <p:cNvCxnSpPr/>
+            <p:nvPr/>
+          </p:nvCxnSpPr>
+          <p:spPr>
+            <a:xfrm>
+              <a:off x="4568474" y="1663333"/>
+              <a:ext cx="0" cy="1465006"/>
+            </a:xfrm>
+            <a:prstGeom prst="line">
+              <a:avLst/>
+            </a:prstGeom>
+            <a:ln w="12700">
+              <a:solidFill>
+                <a:schemeClr val="bg1"/>
+              </a:solidFill>
+            </a:ln>
+          </p:spPr>
+          <p:style>
+            <a:lnRef idx="1">
+              <a:schemeClr val="accent1"/>
+            </a:lnRef>
+            <a:fillRef idx="0">
+              <a:schemeClr val="accent1"/>
+            </a:fillRef>
+            <a:effectRef idx="0">
+              <a:schemeClr val="accent1"/>
+            </a:effectRef>
+            <a:fontRef idx="minor">
+              <a:schemeClr val="tx1"/>
+            </a:fontRef>
+          </p:style>
+        </p:cxnSp>
+        <p:cxnSp>
+          <p:nvCxnSpPr>
+            <p:cNvPr id="3078" name="Connecteur droit 3077">
+              <a:extLst>
+                <a:ext uri="{FF2B5EF4-FFF2-40B4-BE49-F238E27FC236}">
+                  <a16:creationId xmlns:a16="http://schemas.microsoft.com/office/drawing/2014/main" id="{849D0390-8070-B6A1-05AF-B6867AB81465}"/>
+                </a:ext>
+              </a:extLst>
+            </p:cNvPr>
+            <p:cNvCxnSpPr/>
+            <p:nvPr/>
+          </p:nvCxnSpPr>
+          <p:spPr>
+            <a:xfrm>
+              <a:off x="5664465" y="1663333"/>
+              <a:ext cx="0" cy="1465006"/>
+            </a:xfrm>
+            <a:prstGeom prst="line">
+              <a:avLst/>
+            </a:prstGeom>
+            <a:ln w="12700">
+              <a:solidFill>
+                <a:schemeClr val="bg1"/>
+              </a:solidFill>
+            </a:ln>
+          </p:spPr>
+          <p:style>
+            <a:lnRef idx="1">
+              <a:schemeClr val="accent1"/>
+            </a:lnRef>
+            <a:fillRef idx="0">
+              <a:schemeClr val="accent1"/>
+            </a:fillRef>
+            <a:effectRef idx="0">
+              <a:schemeClr val="accent1"/>
+            </a:effectRef>
+            <a:fontRef idx="minor">
+              <a:schemeClr val="tx1"/>
+            </a:fontRef>
+          </p:style>
+        </p:cxnSp>
+        <p:cxnSp>
+          <p:nvCxnSpPr>
+            <p:cNvPr id="3079" name="Connecteur droit 3078">
+              <a:extLst>
+                <a:ext uri="{FF2B5EF4-FFF2-40B4-BE49-F238E27FC236}">
+                  <a16:creationId xmlns:a16="http://schemas.microsoft.com/office/drawing/2014/main" id="{234CD5D0-1C27-3EF4-D3F7-11AA61861ABB}"/>
+                </a:ext>
+              </a:extLst>
+            </p:cNvPr>
+            <p:cNvCxnSpPr/>
+            <p:nvPr/>
+          </p:nvCxnSpPr>
+          <p:spPr>
+            <a:xfrm>
+              <a:off x="6814354" y="1645129"/>
+              <a:ext cx="0" cy="1465006"/>
+            </a:xfrm>
+            <a:prstGeom prst="line">
+              <a:avLst/>
+            </a:prstGeom>
+            <a:ln w="12700">
+              <a:solidFill>
+                <a:schemeClr val="bg1"/>
+              </a:solidFill>
+            </a:ln>
+          </p:spPr>
+          <p:style>
+            <a:lnRef idx="1">
+              <a:schemeClr val="accent1"/>
+            </a:lnRef>
+            <a:fillRef idx="0">
+              <a:schemeClr val="accent1"/>
+            </a:fillRef>
+            <a:effectRef idx="0">
+              <a:schemeClr val="accent1"/>
+            </a:effectRef>
+            <a:fontRef idx="minor">
+              <a:schemeClr val="tx1"/>
+            </a:fontRef>
+          </p:style>
+        </p:cxnSp>
+        <p:cxnSp>
+          <p:nvCxnSpPr>
+            <p:cNvPr id="3080" name="Connecteur droit 3079">
+              <a:extLst>
+                <a:ext uri="{FF2B5EF4-FFF2-40B4-BE49-F238E27FC236}">
+                  <a16:creationId xmlns:a16="http://schemas.microsoft.com/office/drawing/2014/main" id="{3766B61F-5A15-7F28-C198-69447F210591}"/>
+                </a:ext>
+              </a:extLst>
+            </p:cNvPr>
+            <p:cNvCxnSpPr/>
+            <p:nvPr/>
+          </p:nvCxnSpPr>
+          <p:spPr>
+            <a:xfrm>
+              <a:off x="8006904" y="1645129"/>
+              <a:ext cx="0" cy="1465006"/>
+            </a:xfrm>
+            <a:prstGeom prst="line">
+              <a:avLst/>
+            </a:prstGeom>
+            <a:ln w="12700">
+              <a:solidFill>
+                <a:schemeClr val="bg1"/>
+              </a:solidFill>
+            </a:ln>
+          </p:spPr>
+          <p:style>
+            <a:lnRef idx="1">
+              <a:schemeClr val="accent1"/>
+            </a:lnRef>
+            <a:fillRef idx="0">
+              <a:schemeClr val="accent1"/>
+            </a:fillRef>
+            <a:effectRef idx="0">
+              <a:schemeClr val="accent1"/>
+            </a:effectRef>
+            <a:fontRef idx="minor">
+              <a:schemeClr val="tx1"/>
+            </a:fontRef>
+          </p:style>
+        </p:cxnSp>
+        <p:cxnSp>
+          <p:nvCxnSpPr>
+            <p:cNvPr id="3081" name="Connecteur droit 3080">
+              <a:extLst>
+                <a:ext uri="{FF2B5EF4-FFF2-40B4-BE49-F238E27FC236}">
+                  <a16:creationId xmlns:a16="http://schemas.microsoft.com/office/drawing/2014/main" id="{523F9803-470E-AA81-4A74-611517D86849}"/>
+                </a:ext>
+              </a:extLst>
+            </p:cNvPr>
+            <p:cNvCxnSpPr/>
+            <p:nvPr/>
+          </p:nvCxnSpPr>
+          <p:spPr>
+            <a:xfrm>
+              <a:off x="9173130" y="1635003"/>
+              <a:ext cx="0" cy="1465006"/>
+            </a:xfrm>
+            <a:prstGeom prst="line">
+              <a:avLst/>
+            </a:prstGeom>
+            <a:ln w="12700">
+              <a:solidFill>
+                <a:schemeClr val="bg1"/>
+              </a:solidFill>
+            </a:ln>
+          </p:spPr>
+          <p:style>
+            <a:lnRef idx="1">
+              <a:schemeClr val="accent1"/>
+            </a:lnRef>
+            <a:fillRef idx="0">
+              <a:schemeClr val="accent1"/>
+            </a:fillRef>
+            <a:effectRef idx="0">
+              <a:schemeClr val="accent1"/>
+            </a:effectRef>
+            <a:fontRef idx="minor">
+              <a:schemeClr val="tx1"/>
+            </a:fontRef>
+          </p:style>
+        </p:cxnSp>
+      </p:grpSp>
       <p:pic>
         <p:nvPicPr>
-          <p:cNvPr id="10" name="Image 9">
-            <a:extLst>
-              <a:ext uri="{FF2B5EF4-FFF2-40B4-BE49-F238E27FC236}">
-                <a16:creationId xmlns:a16="http://schemas.microsoft.com/office/drawing/2014/main" id="{D17299F2-CCBB-C6E0-F41E-EBA9819898DB}"/>
+          <p:cNvPr id="3085" name="Image 3084">
+            <a:extLst>
+              <a:ext uri="{FF2B5EF4-FFF2-40B4-BE49-F238E27FC236}">
+                <a16:creationId xmlns:a16="http://schemas.microsoft.com/office/drawing/2014/main" id="{01D2CB41-E50D-E410-411E-FDB3A597CB41}"/>
               </a:ext>
             </a:extLst>
           </p:cNvPr>
@@ -3719,15 +6357,15 @@
           <p:nvPr/>
         </p:nvPicPr>
         <p:blipFill>
-          <a:blip r:embed="rId4"/>
+          <a:blip r:embed="rId3"/>
           <a:stretch>
             <a:fillRect/>
           </a:stretch>
         </p:blipFill>
         <p:spPr>
-          <a:xfrm rot="10957746">
-            <a:off x="6461879" y="2301907"/>
-            <a:ext cx="2082800" cy="1841500"/>
+          <a:xfrm>
+            <a:off x="9220389" y="1906519"/>
+            <a:ext cx="3158704" cy="4951481"/>
           </a:xfrm>
           <a:prstGeom prst="rect">
             <a:avLst/>
@@ -3737,7 +6375,7 @@
     </p:spTree>
     <p:extLst>
       <p:ext uri="{BB962C8B-B14F-4D97-AF65-F5344CB8AC3E}">
-        <p14:creationId xmlns:p14="http://schemas.microsoft.com/office/powerpoint/2010/main" val="1198788856"/>
+        <p14:creationId xmlns:p14="http://schemas.microsoft.com/office/powerpoint/2010/main" val="3830684313"/>
       </p:ext>
     </p:extLst>
   </p:cSld>

</xml_diff>